<commit_message>
Adicionados dois slides ao Power Point de apresentação UML
</commit_message>
<xml_diff>
--- a/04 - Docs/01 - Project Manager/08 - UML/00 - Apresentação UML/UML Grupo 3.pptx
+++ b/04 - Docs/01 - Project Manager/08 - UML/00 - Apresentação UML/UML Grupo 3.pptx
@@ -5,17 +5,18 @@
     <p:sldMasterId id="2147483707" r:id="rId1"/>
   </p:sldMasterIdLst>
   <p:notesMasterIdLst>
-    <p:notesMasterId r:id="rId10"/>
+    <p:notesMasterId r:id="rId11"/>
   </p:notesMasterIdLst>
   <p:sldIdLst>
     <p:sldId id="256" r:id="rId2"/>
-    <p:sldId id="257" r:id="rId3"/>
-    <p:sldId id="258" r:id="rId4"/>
-    <p:sldId id="259" r:id="rId5"/>
-    <p:sldId id="260" r:id="rId6"/>
-    <p:sldId id="261" r:id="rId7"/>
-    <p:sldId id="262" r:id="rId8"/>
-    <p:sldId id="263" r:id="rId9"/>
+    <p:sldId id="264" r:id="rId3"/>
+    <p:sldId id="257" r:id="rId4"/>
+    <p:sldId id="258" r:id="rId5"/>
+    <p:sldId id="259" r:id="rId6"/>
+    <p:sldId id="260" r:id="rId7"/>
+    <p:sldId id="261" r:id="rId8"/>
+    <p:sldId id="262" r:id="rId9"/>
+    <p:sldId id="263" r:id="rId10"/>
   </p:sldIdLst>
   <p:sldSz cx="12192000" cy="6858000"/>
   <p:notesSz cx="6858000" cy="9144000"/>
@@ -114,6 +115,11 @@
       </a:defRPr>
     </a:lvl9pPr>
   </p:defaultTextStyle>
+  <p:extLst>
+    <p:ext uri="{EFAFB233-063F-42B5-8137-9DF3F51BA10A}">
+      <p15:sldGuideLst xmlns:p15="http://schemas.microsoft.com/office/powerpoint/2012/main"/>
+    </p:ext>
+  </p:extLst>
 </p:presentation>
 </file>
 
@@ -199,7 +205,7 @@
           <a:p>
             <a:fld id="{D7B64C4F-324A-4982-94AC-AE9956557606}" type="datetimeFigureOut">
               <a:rPr lang="pt-PT" smtClean="0"/>
-              <a:t>16/07/2018</a:t>
+              <a:t>17/07/2018</a:t>
             </a:fld>
             <a:endParaRPr lang="pt-PT"/>
           </a:p>
@@ -608,7 +614,7 @@
           <a:p>
             <a:fld id="{99DC0CBE-9660-45E0-9AC8-94D9D5004E70}" type="datetime1">
               <a:rPr lang="pt-PT" smtClean="0"/>
-              <a:t>16/07/2018</a:t>
+              <a:t>17/07/2018</a:t>
             </a:fld>
             <a:endParaRPr lang="pt-PT"/>
           </a:p>
@@ -778,7 +784,7 @@
           <a:p>
             <a:fld id="{CE106AF8-8308-488D-841E-77D2D6DE1AB3}" type="datetime1">
               <a:rPr lang="pt-PT" smtClean="0"/>
-              <a:t>16/07/2018</a:t>
+              <a:t>17/07/2018</a:t>
             </a:fld>
             <a:endParaRPr lang="pt-PT"/>
           </a:p>
@@ -958,7 +964,7 @@
           <a:p>
             <a:fld id="{6FA79DA2-4F16-448E-B24F-F88BCB80D202}" type="datetime1">
               <a:rPr lang="pt-PT" smtClean="0"/>
-              <a:t>16/07/2018</a:t>
+              <a:t>17/07/2018</a:t>
             </a:fld>
             <a:endParaRPr lang="pt-PT"/>
           </a:p>
@@ -1128,7 +1134,7 @@
           <a:p>
             <a:fld id="{4827E142-971D-4D2D-99F0-1DE707857DD0}" type="datetime1">
               <a:rPr lang="pt-PT" smtClean="0"/>
-              <a:t>16/07/2018</a:t>
+              <a:t>17/07/2018</a:t>
             </a:fld>
             <a:endParaRPr lang="pt-PT"/>
           </a:p>
@@ -1379,7 +1385,7 @@
           <a:p>
             <a:fld id="{B4FC198C-FF38-4CAB-A87F-857D864E4022}" type="datetime1">
               <a:rPr lang="pt-PT" smtClean="0"/>
-              <a:t>16/07/2018</a:t>
+              <a:t>17/07/2018</a:t>
             </a:fld>
             <a:endParaRPr lang="pt-PT"/>
           </a:p>
@@ -1611,7 +1617,7 @@
           <a:p>
             <a:fld id="{139CC831-A206-4156-ABBA-4D7D4D1EB4A9}" type="datetime1">
               <a:rPr lang="pt-PT" smtClean="0"/>
-              <a:t>16/07/2018</a:t>
+              <a:t>17/07/2018</a:t>
             </a:fld>
             <a:endParaRPr lang="pt-PT"/>
           </a:p>
@@ -1958,7 +1964,7 @@
           <a:p>
             <a:fld id="{D7CD316C-02BA-4B2B-AE1C-BFE2F87B650E}" type="datetime1">
               <a:rPr lang="pt-PT" smtClean="0"/>
-              <a:t>16/07/2018</a:t>
+              <a:t>17/07/2018</a:t>
             </a:fld>
             <a:endParaRPr lang="pt-PT"/>
           </a:p>
@@ -2076,7 +2082,7 @@
           <a:p>
             <a:fld id="{2FDD42CA-CE0A-4347-B6AE-870C0DC611E7}" type="datetime1">
               <a:rPr lang="pt-PT" smtClean="0"/>
-              <a:t>16/07/2018</a:t>
+              <a:t>17/07/2018</a:t>
             </a:fld>
             <a:endParaRPr lang="pt-PT"/>
           </a:p>
@@ -2194,7 +2200,7 @@
           <a:p>
             <a:fld id="{7A8A9DF7-D7B3-45E3-A219-C79C1A0767F3}" type="datetime1">
               <a:rPr lang="pt-PT" smtClean="0"/>
-              <a:t>16/07/2018</a:t>
+              <a:t>17/07/2018</a:t>
             </a:fld>
             <a:endParaRPr lang="pt-PT"/>
           </a:p>
@@ -2478,7 +2484,7 @@
           <a:p>
             <a:fld id="{A7C4C64E-965F-4B1C-A4E1-6E1896C3B1BE}" type="datetime1">
               <a:rPr lang="pt-PT" smtClean="0"/>
-              <a:t>16/07/2018</a:t>
+              <a:t>17/07/2018</a:t>
             </a:fld>
             <a:endParaRPr lang="pt-PT"/>
           </a:p>
@@ -2742,7 +2748,7 @@
           <a:p>
             <a:fld id="{062F934F-9B5B-46B2-BB65-8A64F7272566}" type="datetime1">
               <a:rPr lang="pt-PT" smtClean="0"/>
-              <a:t>16/07/2018</a:t>
+              <a:t>17/07/2018</a:t>
             </a:fld>
             <a:endParaRPr lang="pt-PT"/>
           </a:p>
@@ -2956,7 +2962,7 @@
           <a:p>
             <a:fld id="{B2E8085C-71E8-4D38-9CF6-AEBDB4F1CDC0}" type="datetime1">
               <a:rPr lang="pt-PT" smtClean="0"/>
-              <a:t>16/07/2018</a:t>
+              <a:t>17/07/2018</a:t>
             </a:fld>
             <a:endParaRPr lang="pt-PT"/>
           </a:p>
@@ -3607,7 +3613,7 @@
         </p:blipFill>
         <p:spPr>
           <a:xfrm>
-            <a:off x="143711" y="111930"/>
+            <a:off x="143711" y="117141"/>
             <a:ext cx="2530772" cy="882369"/>
           </a:xfrm>
           <a:prstGeom prst="rect">
@@ -3629,7 +3635,7 @@
         </p:nvSpPr>
         <p:spPr>
           <a:xfrm>
-            <a:off x="0" y="6421249"/>
+            <a:off x="0" y="6457890"/>
             <a:ext cx="4717638" cy="400110"/>
           </a:xfrm>
           <a:prstGeom prst="rect">
@@ -3707,7 +3713,7 @@
         </p:nvSpPr>
         <p:spPr>
           <a:xfrm>
-            <a:off x="9897974" y="6460893"/>
+            <a:off x="9897974" y="6457890"/>
             <a:ext cx="2294026" cy="400110"/>
           </a:xfrm>
           <a:prstGeom prst="rect">
@@ -3741,48 +3747,159 @@
           </a:p>
         </p:txBody>
       </p:sp>
-      <p:pic>
-        <p:nvPicPr>
-          <p:cNvPr id="4" name="Imagem 3">
+      <p:sp>
+        <p:nvSpPr>
+          <p:cNvPr id="2" name="CaixaDeTexto 1">
             <a:extLst>
               <a:ext uri="{FF2B5EF4-FFF2-40B4-BE49-F238E27FC236}">
-                <a16:creationId xmlns:a16="http://schemas.microsoft.com/office/drawing/2014/main" id="{8BE13DF9-3629-4E1F-ADD6-B5BA38F15965}"/>
+                <a16:creationId xmlns:a16="http://schemas.microsoft.com/office/drawing/2014/main" id="{AFE48F3C-616A-4124-A80C-DB03BC000DE9}"/>
               </a:ext>
             </a:extLst>
           </p:cNvPr>
-          <p:cNvPicPr>
-            <a:picLocks noChangeAspect="1"/>
-          </p:cNvPicPr>
+          <p:cNvSpPr txBox="1"/>
           <p:nvPr/>
-        </p:nvPicPr>
-        <p:blipFill>
-          <a:blip r:embed="rId3">
-            <a:extLst>
-              <a:ext uri="{28A0092B-C50C-407E-A947-70E740481C1C}">
-                <a14:useLocalDpi xmlns:a14="http://schemas.microsoft.com/office/drawing/2010/main" val="0"/>
-              </a:ext>
-            </a:extLst>
-          </a:blip>
-          <a:stretch>
-            <a:fillRect/>
-          </a:stretch>
-        </p:blipFill>
-        <p:spPr>
-          <a:xfrm>
-            <a:off x="3073320" y="895351"/>
-            <a:ext cx="8585279" cy="5525898"/>
+        </p:nvSpPr>
+        <p:spPr>
+          <a:xfrm>
+            <a:off x="1038687" y="1615736"/>
+            <a:ext cx="10289220" cy="4462760"/>
           </a:xfrm>
           <a:prstGeom prst="rect">
             <a:avLst/>
           </a:prstGeom>
-        </p:spPr>
-      </p:pic>
-      <p:sp>
-        <p:nvSpPr>
-          <p:cNvPr id="11" name="CaixaDeTexto 10">
+          <a:noFill/>
+        </p:spPr>
+        <p:txBody>
+          <a:bodyPr wrap="square" rtlCol="0">
+            <a:spAutoFit/>
+          </a:bodyPr>
+          <a:lstStyle/>
+          <a:p>
+            <a:pPr algn="just"/>
+            <a:r>
+              <a:rPr lang="pt-PT" dirty="0">
+                <a:solidFill>
+                  <a:schemeClr val="accent1">
+                    <a:lumMod val="50000"/>
+                  </a:schemeClr>
+                </a:solidFill>
+              </a:rPr>
+              <a:t>Este projeto nasce de uma necessidade real, que o nosso cliente Ricardo Baptista, gostava de ver solucionada. </a:t>
+            </a:r>
+          </a:p>
+          <a:p>
+            <a:pPr algn="just"/>
+            <a:endParaRPr lang="pt-PT" dirty="0">
+              <a:solidFill>
+                <a:schemeClr val="accent1">
+                  <a:lumMod val="50000"/>
+                </a:schemeClr>
+              </a:solidFill>
+            </a:endParaRPr>
+          </a:p>
+          <a:p>
+            <a:pPr algn="just"/>
+            <a:r>
+              <a:rPr lang="pt-PT" dirty="0">
+                <a:solidFill>
+                  <a:schemeClr val="accent1">
+                    <a:lumMod val="50000"/>
+                  </a:schemeClr>
+                </a:solidFill>
+              </a:rPr>
+              <a:t>Basicamente, ele guarda em folhas de Excel registos detalhados de jogos de futebol, para posteriormente os poder analisar de forma estatística, e consequentemente, segundo a execução de vários algoritmos, tentar prever de forma eficaz vários prognósticos para vários mercados de apostas de futebol.</a:t>
+            </a:r>
+          </a:p>
+          <a:p>
+            <a:pPr algn="just"/>
+            <a:endParaRPr lang="en-US" dirty="0">
+              <a:solidFill>
+                <a:schemeClr val="accent1">
+                  <a:lumMod val="50000"/>
+                </a:schemeClr>
+              </a:solidFill>
+            </a:endParaRPr>
+          </a:p>
+          <a:p>
+            <a:pPr algn="just"/>
+            <a:r>
+              <a:rPr lang="pt-PT" dirty="0">
+                <a:solidFill>
+                  <a:schemeClr val="accent1">
+                    <a:lumMod val="50000"/>
+                  </a:schemeClr>
+                </a:solidFill>
+              </a:rPr>
+              <a:t>Esta abordagem é bastante ineficiente, trabalhosa e propensa a erros. </a:t>
+            </a:r>
+          </a:p>
+          <a:p>
+            <a:pPr algn="just"/>
+            <a:endParaRPr lang="pt-PT" dirty="0">
+              <a:solidFill>
+                <a:schemeClr val="accent1">
+                  <a:lumMod val="50000"/>
+                </a:schemeClr>
+              </a:solidFill>
+            </a:endParaRPr>
+          </a:p>
+          <a:p>
+            <a:pPr algn="just"/>
+            <a:r>
+              <a:rPr lang="pt-PT" dirty="0">
+                <a:solidFill>
+                  <a:schemeClr val="accent1">
+                    <a:lumMod val="50000"/>
+                  </a:schemeClr>
+                </a:solidFill>
+              </a:rPr>
+              <a:t>Portanto o desejo do Ricardo Baptista, é poder automatizar todo este processo. </a:t>
+            </a:r>
+          </a:p>
+          <a:p>
+            <a:pPr algn="just"/>
+            <a:endParaRPr lang="en-US" dirty="0">
+              <a:solidFill>
+                <a:schemeClr val="accent1">
+                  <a:lumMod val="50000"/>
+                </a:schemeClr>
+              </a:solidFill>
+            </a:endParaRPr>
+          </a:p>
+          <a:p>
+            <a:pPr algn="just"/>
+            <a:r>
+              <a:rPr lang="en-US" dirty="0">
+                <a:solidFill>
+                  <a:schemeClr val="accent1">
+                    <a:lumMod val="50000"/>
+                  </a:schemeClr>
+                </a:solidFill>
+              </a:rPr>
+              <a:t>Para a</a:t>
+            </a:r>
+            <a:r>
+              <a:rPr lang="pt-PT" dirty="0">
+                <a:solidFill>
+                  <a:schemeClr val="accent1">
+                    <a:lumMod val="50000"/>
+                  </a:schemeClr>
+                </a:solidFill>
+              </a:rPr>
+              <a:t>lém do que ele tem já implementado em Excel, pediu-nos para o sistema guardar um histórico de todos os prognósticos que forem gerados ao longo do tempo. Desta forma será possível, após uma base sólida de prognósticos acumulados, determinar alguma alteração ou novas soluções para implementar no sistema.</a:t>
+            </a:r>
+          </a:p>
+          <a:p>
+            <a:endParaRPr lang="pt-PT" sz="1400" dirty="0"/>
+          </a:p>
+        </p:txBody>
+      </p:sp>
+      <p:sp>
+        <p:nvSpPr>
+          <p:cNvPr id="8" name="CaixaDeTexto 7">
             <a:extLst>
               <a:ext uri="{FF2B5EF4-FFF2-40B4-BE49-F238E27FC236}">
-                <a16:creationId xmlns:a16="http://schemas.microsoft.com/office/drawing/2014/main" id="{E2DA9DF2-3C96-41B5-8368-67099D85D096}"/>
+                <a16:creationId xmlns:a16="http://schemas.microsoft.com/office/drawing/2014/main" id="{18BE4D7A-EDB0-4F0E-8A3F-3FBE1E77B25F}"/>
               </a:ext>
             </a:extLst>
           </p:cNvPr>
@@ -3820,29 +3937,22 @@
           <a:p>
             <a:pPr algn="ctr"/>
             <a:r>
-              <a:rPr lang="en-US" sz="2400" dirty="0">
+              <a:rPr lang="pt-PT" sz="2400" dirty="0">
                 <a:solidFill>
                   <a:schemeClr val="accent1">
                     <a:lumMod val="50000"/>
                   </a:schemeClr>
                 </a:solidFill>
               </a:rPr>
-              <a:t>Use Cases</a:t>
-            </a:r>
-            <a:endParaRPr lang="pt-PT" sz="2400" dirty="0">
-              <a:solidFill>
-                <a:schemeClr val="accent1">
-                  <a:lumMod val="50000"/>
-                </a:schemeClr>
-              </a:solidFill>
-            </a:endParaRPr>
+              <a:t>Contextualização</a:t>
+            </a:r>
           </a:p>
         </p:txBody>
       </p:sp>
     </p:spTree>
     <p:extLst>
       <p:ext uri="{BB962C8B-B14F-4D97-AF65-F5344CB8AC3E}">
-        <p14:creationId xmlns:p14="http://schemas.microsoft.com/office/powerpoint/2010/main" val="444024083"/>
+        <p14:creationId xmlns:p14="http://schemas.microsoft.com/office/powerpoint/2010/main" val="316655957"/>
       </p:ext>
     </p:extLst>
   </p:cSld>
@@ -3997,7 +4107,7 @@
         </p:nvSpPr>
         <p:spPr>
           <a:xfrm>
-            <a:off x="9897974" y="6457890"/>
+            <a:off x="9897974" y="6460893"/>
             <a:ext cx="2294026" cy="400110"/>
           </a:xfrm>
           <a:prstGeom prst="rect">
@@ -4033,10 +4143,10 @@
       </p:sp>
       <p:pic>
         <p:nvPicPr>
-          <p:cNvPr id="8" name="Imagem 7">
+          <p:cNvPr id="4" name="Imagem 3">
             <a:extLst>
               <a:ext uri="{FF2B5EF4-FFF2-40B4-BE49-F238E27FC236}">
-                <a16:creationId xmlns:a16="http://schemas.microsoft.com/office/drawing/2014/main" id="{89DB8388-25CD-4867-A4B3-39616E2BD296}"/>
+                <a16:creationId xmlns:a16="http://schemas.microsoft.com/office/drawing/2014/main" id="{8BE13DF9-3629-4E1F-ADD6-B5BA38F15965}"/>
               </a:ext>
             </a:extLst>
           </p:cNvPr>
@@ -4059,8 +4169,8 @@
         </p:blipFill>
         <p:spPr>
           <a:xfrm>
-            <a:off x="952028" y="994299"/>
-            <a:ext cx="10621528" cy="5426950"/>
+            <a:off x="3073320" y="895351"/>
+            <a:ext cx="8585279" cy="5525898"/>
           </a:xfrm>
           <a:prstGeom prst="rect">
             <a:avLst/>
@@ -4069,10 +4179,10 @@
       </p:pic>
       <p:sp>
         <p:nvSpPr>
-          <p:cNvPr id="9" name="CaixaDeTexto 8">
+          <p:cNvPr id="11" name="CaixaDeTexto 10">
             <a:extLst>
               <a:ext uri="{FF2B5EF4-FFF2-40B4-BE49-F238E27FC236}">
-                <a16:creationId xmlns:a16="http://schemas.microsoft.com/office/drawing/2014/main" id="{0683327A-A768-42E7-BD28-F51B50E75774}"/>
+                <a16:creationId xmlns:a16="http://schemas.microsoft.com/office/drawing/2014/main" id="{E2DA9DF2-3C96-41B5-8368-67099D85D096}"/>
               </a:ext>
             </a:extLst>
           </p:cNvPr>
@@ -4081,8 +4191,8 @@
         </p:nvSpPr>
         <p:spPr>
           <a:xfrm>
-            <a:off x="3209925" y="111930"/>
-            <a:ext cx="8838364" cy="461665"/>
+            <a:off x="3073319" y="91449"/>
+            <a:ext cx="8974969" cy="461665"/>
           </a:xfrm>
           <a:prstGeom prst="rect">
             <a:avLst/>
@@ -4117,7 +4227,7 @@
                   </a:schemeClr>
                 </a:solidFill>
               </a:rPr>
-              <a:t>Modelo de Dados</a:t>
+              <a:t>Use Cases</a:t>
             </a:r>
             <a:endParaRPr lang="pt-PT" sz="2400" dirty="0">
               <a:solidFill>
@@ -4132,7 +4242,7 @@
     </p:spTree>
     <p:extLst>
       <p:ext uri="{BB962C8B-B14F-4D97-AF65-F5344CB8AC3E}">
-        <p14:creationId xmlns:p14="http://schemas.microsoft.com/office/powerpoint/2010/main" val="4003906345"/>
+        <p14:creationId xmlns:p14="http://schemas.microsoft.com/office/powerpoint/2010/main" val="444024083"/>
       </p:ext>
     </p:extLst>
   </p:cSld>
@@ -4323,10 +4433,10 @@
       </p:sp>
       <p:pic>
         <p:nvPicPr>
-          <p:cNvPr id="4" name="Imagem 3">
+          <p:cNvPr id="8" name="Imagem 7">
             <a:extLst>
               <a:ext uri="{FF2B5EF4-FFF2-40B4-BE49-F238E27FC236}">
-                <a16:creationId xmlns:a16="http://schemas.microsoft.com/office/drawing/2014/main" id="{91A0D4DD-2487-4E39-B132-0DA225EA38B8}"/>
+                <a16:creationId xmlns:a16="http://schemas.microsoft.com/office/drawing/2014/main" id="{89DB8388-25CD-4867-A4B3-39616E2BD296}"/>
               </a:ext>
             </a:extLst>
           </p:cNvPr>
@@ -4349,8 +4459,8 @@
         </p:blipFill>
         <p:spPr>
           <a:xfrm>
-            <a:off x="495300" y="1190625"/>
-            <a:ext cx="11249025" cy="5153025"/>
+            <a:off x="952028" y="994299"/>
+            <a:ext cx="10621528" cy="5426950"/>
           </a:xfrm>
           <a:prstGeom prst="rect">
             <a:avLst/>
@@ -4359,10 +4469,10 @@
       </p:pic>
       <p:sp>
         <p:nvSpPr>
-          <p:cNvPr id="10" name="CaixaDeTexto 9">
+          <p:cNvPr id="9" name="CaixaDeTexto 8">
             <a:extLst>
               <a:ext uri="{FF2B5EF4-FFF2-40B4-BE49-F238E27FC236}">
-                <a16:creationId xmlns:a16="http://schemas.microsoft.com/office/drawing/2014/main" id="{A6341B83-D75F-4BF2-95DA-F4215DE215E0}"/>
+                <a16:creationId xmlns:a16="http://schemas.microsoft.com/office/drawing/2014/main" id="{0683327A-A768-42E7-BD28-F51B50E75774}"/>
               </a:ext>
             </a:extLst>
           </p:cNvPr>
@@ -4407,7 +4517,7 @@
                   </a:schemeClr>
                 </a:solidFill>
               </a:rPr>
-              <a:t>Dicionário de Contexto</a:t>
+              <a:t>Modelo de Dados</a:t>
             </a:r>
             <a:endParaRPr lang="pt-PT" sz="2400" dirty="0">
               <a:solidFill>
@@ -4422,7 +4532,7 @@
     </p:spTree>
     <p:extLst>
       <p:ext uri="{BB962C8B-B14F-4D97-AF65-F5344CB8AC3E}">
-        <p14:creationId xmlns:p14="http://schemas.microsoft.com/office/powerpoint/2010/main" val="3109399078"/>
+        <p14:creationId xmlns:p14="http://schemas.microsoft.com/office/powerpoint/2010/main" val="4003906345"/>
       </p:ext>
     </p:extLst>
   </p:cSld>
@@ -4611,74 +4721,12 @@
           </a:p>
         </p:txBody>
       </p:sp>
-      <p:sp>
-        <p:nvSpPr>
-          <p:cNvPr id="2" name="CaixaDeTexto 1">
+      <p:pic>
+        <p:nvPicPr>
+          <p:cNvPr id="4" name="Imagem 3">
             <a:extLst>
               <a:ext uri="{FF2B5EF4-FFF2-40B4-BE49-F238E27FC236}">
-                <a16:creationId xmlns:a16="http://schemas.microsoft.com/office/drawing/2014/main" id="{DED64B3C-BD7E-49D6-9BF6-FB29863CD7DD}"/>
-              </a:ext>
-            </a:extLst>
-          </p:cNvPr>
-          <p:cNvSpPr txBox="1"/>
-          <p:nvPr/>
-        </p:nvSpPr>
-        <p:spPr>
-          <a:xfrm>
-            <a:off x="3209925" y="111930"/>
-            <a:ext cx="8838364" cy="461665"/>
-          </a:xfrm>
-          <a:prstGeom prst="rect">
-            <a:avLst/>
-          </a:prstGeom>
-        </p:spPr>
-        <p:style>
-          <a:lnRef idx="0">
-            <a:schemeClr val="accent4"/>
-          </a:lnRef>
-          <a:fillRef idx="3">
-            <a:schemeClr val="accent4"/>
-          </a:fillRef>
-          <a:effectRef idx="3">
-            <a:schemeClr val="accent4"/>
-          </a:effectRef>
-          <a:fontRef idx="minor">
-            <a:schemeClr val="lt1"/>
-          </a:fontRef>
-        </p:style>
-        <p:txBody>
-          <a:bodyPr wrap="square" rtlCol="0">
-            <a:spAutoFit/>
-          </a:bodyPr>
-          <a:lstStyle/>
-          <a:p>
-            <a:pPr algn="ctr"/>
-            <a:r>
-              <a:rPr lang="en-US" sz="2400" dirty="0">
-                <a:solidFill>
-                  <a:schemeClr val="accent1">
-                    <a:lumMod val="50000"/>
-                  </a:schemeClr>
-                </a:solidFill>
-              </a:rPr>
-              <a:t>Dicionário de Fluxo de Dados</a:t>
-            </a:r>
-            <a:endParaRPr lang="pt-PT" sz="2400" dirty="0">
-              <a:solidFill>
-                <a:schemeClr val="accent1">
-                  <a:lumMod val="50000"/>
-                </a:schemeClr>
-              </a:solidFill>
-            </a:endParaRPr>
-          </a:p>
-        </p:txBody>
-      </p:sp>
-      <p:pic>
-        <p:nvPicPr>
-          <p:cNvPr id="8" name="Imagem 7">
-            <a:extLst>
-              <a:ext uri="{FF2B5EF4-FFF2-40B4-BE49-F238E27FC236}">
-                <a16:creationId xmlns:a16="http://schemas.microsoft.com/office/drawing/2014/main" id="{D0D067C3-ADE3-4543-9F14-410BCEAD420D}"/>
+                <a16:creationId xmlns:a16="http://schemas.microsoft.com/office/drawing/2014/main" id="{91A0D4DD-2487-4E39-B132-0DA225EA38B8}"/>
               </a:ext>
             </a:extLst>
           </p:cNvPr>
@@ -4701,18 +4749,80 @@
         </p:blipFill>
         <p:spPr>
           <a:xfrm>
-            <a:off x="742950" y="994299"/>
-            <a:ext cx="10834968" cy="5358876"/>
+            <a:off x="495300" y="1190625"/>
+            <a:ext cx="11249025" cy="5153025"/>
           </a:xfrm>
           <a:prstGeom prst="rect">
             <a:avLst/>
           </a:prstGeom>
         </p:spPr>
       </p:pic>
+      <p:sp>
+        <p:nvSpPr>
+          <p:cNvPr id="10" name="CaixaDeTexto 9">
+            <a:extLst>
+              <a:ext uri="{FF2B5EF4-FFF2-40B4-BE49-F238E27FC236}">
+                <a16:creationId xmlns:a16="http://schemas.microsoft.com/office/drawing/2014/main" id="{A6341B83-D75F-4BF2-95DA-F4215DE215E0}"/>
+              </a:ext>
+            </a:extLst>
+          </p:cNvPr>
+          <p:cNvSpPr txBox="1"/>
+          <p:nvPr/>
+        </p:nvSpPr>
+        <p:spPr>
+          <a:xfrm>
+            <a:off x="3209925" y="111930"/>
+            <a:ext cx="8838364" cy="461665"/>
+          </a:xfrm>
+          <a:prstGeom prst="rect">
+            <a:avLst/>
+          </a:prstGeom>
+        </p:spPr>
+        <p:style>
+          <a:lnRef idx="0">
+            <a:schemeClr val="accent4"/>
+          </a:lnRef>
+          <a:fillRef idx="3">
+            <a:schemeClr val="accent4"/>
+          </a:fillRef>
+          <a:effectRef idx="3">
+            <a:schemeClr val="accent4"/>
+          </a:effectRef>
+          <a:fontRef idx="minor">
+            <a:schemeClr val="lt1"/>
+          </a:fontRef>
+        </p:style>
+        <p:txBody>
+          <a:bodyPr wrap="square" rtlCol="0">
+            <a:spAutoFit/>
+          </a:bodyPr>
+          <a:lstStyle/>
+          <a:p>
+            <a:pPr algn="ctr"/>
+            <a:r>
+              <a:rPr lang="en-US" sz="2400" dirty="0">
+                <a:solidFill>
+                  <a:schemeClr val="accent1">
+                    <a:lumMod val="50000"/>
+                  </a:schemeClr>
+                </a:solidFill>
+              </a:rPr>
+              <a:t>Dicionário de Contexto</a:t>
+            </a:r>
+            <a:endParaRPr lang="pt-PT" sz="2400" dirty="0">
+              <a:solidFill>
+                <a:schemeClr val="accent1">
+                  <a:lumMod val="50000"/>
+                </a:schemeClr>
+              </a:solidFill>
+            </a:endParaRPr>
+          </a:p>
+        </p:txBody>
+      </p:sp>
     </p:spTree>
     <p:extLst>
       <p:ext uri="{BB962C8B-B14F-4D97-AF65-F5344CB8AC3E}">
-        <p14:creationId xmlns:p14="http://schemas.microsoft.com/office/powerpoint/2010/main" val="4258365801"/>
+        <p14:creationId xmlns:p14="http://schemas.microsoft.com/office/powerpoint/2010/main" val="3109399078"/>
       </p:ext>
     </p:extLst>
   </p:cSld>
@@ -4951,27 +5061,7 @@
                   </a:schemeClr>
                 </a:solidFill>
               </a:rPr>
-              <a:t>Diagrama de Sequência (</a:t>
-            </a:r>
-            <a:r>
-              <a:rPr lang="en-US" sz="2000" dirty="0">
-                <a:solidFill>
-                  <a:schemeClr val="accent1">
-                    <a:lumMod val="50000"/>
-                  </a:schemeClr>
-                </a:solidFill>
-              </a:rPr>
-              <a:t>Listar Próximos Jogos</a:t>
-            </a:r>
-            <a:r>
-              <a:rPr lang="en-US" sz="2400" dirty="0">
-                <a:solidFill>
-                  <a:schemeClr val="accent1">
-                    <a:lumMod val="50000"/>
-                  </a:schemeClr>
-                </a:solidFill>
-              </a:rPr>
-              <a:t>)</a:t>
+              <a:t>Dicionário de Fluxo de Dados</a:t>
             </a:r>
             <a:endParaRPr lang="pt-PT" sz="2400" dirty="0">
               <a:solidFill>
@@ -4985,10 +5075,10 @@
       </p:sp>
       <p:pic>
         <p:nvPicPr>
-          <p:cNvPr id="4" name="Imagem 3">
+          <p:cNvPr id="8" name="Imagem 7">
             <a:extLst>
               <a:ext uri="{FF2B5EF4-FFF2-40B4-BE49-F238E27FC236}">
-                <a16:creationId xmlns:a16="http://schemas.microsoft.com/office/drawing/2014/main" id="{6986F030-6789-4E26-A2B6-5E0A118AD472}"/>
+                <a16:creationId xmlns:a16="http://schemas.microsoft.com/office/drawing/2014/main" id="{D0D067C3-ADE3-4543-9F14-410BCEAD420D}"/>
               </a:ext>
             </a:extLst>
           </p:cNvPr>
@@ -5011,8 +5101,8 @@
         </p:blipFill>
         <p:spPr>
           <a:xfrm>
-            <a:off x="1714500" y="1509147"/>
-            <a:ext cx="8838363" cy="4624954"/>
+            <a:off x="742950" y="994299"/>
+            <a:ext cx="10834968" cy="5358876"/>
           </a:xfrm>
           <a:prstGeom prst="rect">
             <a:avLst/>
@@ -5022,7 +5112,7 @@
     </p:spTree>
     <p:extLst>
       <p:ext uri="{BB962C8B-B14F-4D97-AF65-F5344CB8AC3E}">
-        <p14:creationId xmlns:p14="http://schemas.microsoft.com/office/powerpoint/2010/main" val="349134860"/>
+        <p14:creationId xmlns:p14="http://schemas.microsoft.com/office/powerpoint/2010/main" val="4258365801"/>
       </p:ext>
     </p:extLst>
   </p:cSld>
@@ -5264,14 +5354,14 @@
               <a:t>Diagrama de Sequência (</a:t>
             </a:r>
             <a:r>
-              <a:rPr lang="pt-PT" sz="2000" dirty="0">
+              <a:rPr lang="en-US" sz="2000" dirty="0">
                 <a:solidFill>
                   <a:schemeClr val="accent1">
                     <a:lumMod val="50000"/>
                   </a:schemeClr>
                 </a:solidFill>
               </a:rPr>
-              <a:t>Subscrever Newsletter</a:t>
+              <a:t>Listar Próximos Jogos</a:t>
             </a:r>
             <a:r>
               <a:rPr lang="en-US" sz="2400" dirty="0">
@@ -5295,10 +5385,10 @@
       </p:sp>
       <p:pic>
         <p:nvPicPr>
-          <p:cNvPr id="8" name="Imagem 7">
+          <p:cNvPr id="4" name="Imagem 3">
             <a:extLst>
               <a:ext uri="{FF2B5EF4-FFF2-40B4-BE49-F238E27FC236}">
-                <a16:creationId xmlns:a16="http://schemas.microsoft.com/office/drawing/2014/main" id="{D985ED82-EFFE-4399-8654-B09381049FBB}"/>
+                <a16:creationId xmlns:a16="http://schemas.microsoft.com/office/drawing/2014/main" id="{6986F030-6789-4E26-A2B6-5E0A118AD472}"/>
               </a:ext>
             </a:extLst>
           </p:cNvPr>
@@ -5321,8 +5411,8 @@
         </p:blipFill>
         <p:spPr>
           <a:xfrm>
-            <a:off x="2495550" y="1514474"/>
-            <a:ext cx="7762875" cy="4695825"/>
+            <a:off x="1714500" y="1509147"/>
+            <a:ext cx="8838363" cy="4624954"/>
           </a:xfrm>
           <a:prstGeom prst="rect">
             <a:avLst/>
@@ -5332,7 +5422,7 @@
     </p:spTree>
     <p:extLst>
       <p:ext uri="{BB962C8B-B14F-4D97-AF65-F5344CB8AC3E}">
-        <p14:creationId xmlns:p14="http://schemas.microsoft.com/office/powerpoint/2010/main" val="1405741742"/>
+        <p14:creationId xmlns:p14="http://schemas.microsoft.com/office/powerpoint/2010/main" val="349134860"/>
       </p:ext>
     </p:extLst>
   </p:cSld>
@@ -5633,6 +5723,296 @@
           <a:xfrm>
             <a:off x="2495550" y="1514474"/>
             <a:ext cx="7762875" cy="4695825"/>
+          </a:xfrm>
+          <a:prstGeom prst="rect">
+            <a:avLst/>
+          </a:prstGeom>
+        </p:spPr>
+      </p:pic>
+    </p:spTree>
+    <p:extLst>
+      <p:ext uri="{BB962C8B-B14F-4D97-AF65-F5344CB8AC3E}">
+        <p14:creationId xmlns:p14="http://schemas.microsoft.com/office/powerpoint/2010/main" val="1405741742"/>
+      </p:ext>
+    </p:extLst>
+  </p:cSld>
+  <p:clrMapOvr>
+    <a:masterClrMapping/>
+  </p:clrMapOvr>
+</p:sld>
+</file>
+
+<file path=ppt/slides/slide9.xml><?xml version="1.0" encoding="utf-8"?>
+<p:sld xmlns:a="http://schemas.openxmlformats.org/drawingml/2006/main" xmlns:r="http://schemas.openxmlformats.org/officeDocument/2006/relationships" xmlns:p="http://schemas.openxmlformats.org/presentationml/2006/main">
+  <p:cSld>
+    <p:spTree>
+      <p:nvGrpSpPr>
+        <p:cNvPr id="1" name=""/>
+        <p:cNvGrpSpPr/>
+        <p:nvPr/>
+      </p:nvGrpSpPr>
+      <p:grpSpPr>
+        <a:xfrm>
+          <a:off x="0" y="0"/>
+          <a:ext cx="0" cy="0"/>
+          <a:chOff x="0" y="0"/>
+          <a:chExt cx="0" cy="0"/>
+        </a:xfrm>
+      </p:grpSpPr>
+      <p:pic>
+        <p:nvPicPr>
+          <p:cNvPr id="5" name="Imagem 4">
+            <a:extLst>
+              <a:ext uri="{FF2B5EF4-FFF2-40B4-BE49-F238E27FC236}">
+                <a16:creationId xmlns:a16="http://schemas.microsoft.com/office/drawing/2014/main" id="{003B6523-7228-4E24-BF75-D68FF276CDDE}"/>
+              </a:ext>
+            </a:extLst>
+          </p:cNvPr>
+          <p:cNvPicPr>
+            <a:picLocks noChangeAspect="1"/>
+          </p:cNvPicPr>
+          <p:nvPr/>
+        </p:nvPicPr>
+        <p:blipFill>
+          <a:blip r:embed="rId2">
+            <a:extLst>
+              <a:ext uri="{28A0092B-C50C-407E-A947-70E740481C1C}">
+                <a14:useLocalDpi xmlns:a14="http://schemas.microsoft.com/office/drawing/2010/main" val="0"/>
+              </a:ext>
+            </a:extLst>
+          </a:blip>
+          <a:stretch>
+            <a:fillRect/>
+          </a:stretch>
+        </p:blipFill>
+        <p:spPr>
+          <a:xfrm>
+            <a:off x="143711" y="111930"/>
+            <a:ext cx="2530772" cy="882369"/>
+          </a:xfrm>
+          <a:prstGeom prst="rect">
+            <a:avLst/>
+          </a:prstGeom>
+        </p:spPr>
+      </p:pic>
+      <p:sp>
+        <p:nvSpPr>
+          <p:cNvPr id="6" name="CaixaDeTexto 5">
+            <a:extLst>
+              <a:ext uri="{FF2B5EF4-FFF2-40B4-BE49-F238E27FC236}">
+                <a16:creationId xmlns:a16="http://schemas.microsoft.com/office/drawing/2014/main" id="{0D8912D2-B081-46A3-B4A0-334D4495E6F0}"/>
+              </a:ext>
+            </a:extLst>
+          </p:cNvPr>
+          <p:cNvSpPr txBox="1"/>
+          <p:nvPr/>
+        </p:nvSpPr>
+        <p:spPr>
+          <a:xfrm>
+            <a:off x="0" y="6421249"/>
+            <a:ext cx="4717638" cy="400110"/>
+          </a:xfrm>
+          <a:prstGeom prst="rect">
+            <a:avLst/>
+          </a:prstGeom>
+          <a:noFill/>
+        </p:spPr>
+        <p:txBody>
+          <a:bodyPr wrap="none" rtlCol="0">
+            <a:spAutoFit/>
+          </a:bodyPr>
+          <a:lstStyle/>
+          <a:p>
+            <a:r>
+              <a:rPr lang="en-US" sz="2000" dirty="0">
+                <a:solidFill>
+                  <a:schemeClr val="accent1">
+                    <a:lumMod val="50000"/>
+                  </a:schemeClr>
+                </a:solidFill>
+              </a:rPr>
+              <a:t>TPSIP_10.17 </a:t>
+            </a:r>
+            <a:r>
+              <a:rPr lang="en-US" sz="1400" dirty="0">
+                <a:solidFill>
+                  <a:schemeClr val="accent1">
+                    <a:lumMod val="50000"/>
+                  </a:schemeClr>
+                </a:solidFill>
+              </a:rPr>
+              <a:t>-</a:t>
+            </a:r>
+            <a:r>
+              <a:rPr lang="en-US" dirty="0">
+                <a:solidFill>
+                  <a:schemeClr val="accent1">
+                    <a:lumMod val="50000"/>
+                  </a:schemeClr>
+                </a:solidFill>
+              </a:rPr>
+              <a:t> </a:t>
+            </a:r>
+            <a:r>
+              <a:rPr lang="en-US" sz="1400" dirty="0">
+                <a:solidFill>
+                  <a:schemeClr val="accent1">
+                    <a:lumMod val="50000"/>
+                  </a:schemeClr>
+                </a:solidFill>
+              </a:rPr>
+              <a:t>Bruno Ferreira, João Santos e Luís Passeira</a:t>
+            </a:r>
+            <a:endParaRPr lang="pt-PT" sz="1400" dirty="0">
+              <a:solidFill>
+                <a:schemeClr val="accent1">
+                  <a:lumMod val="50000"/>
+                </a:schemeClr>
+              </a:solidFill>
+            </a:endParaRPr>
+          </a:p>
+        </p:txBody>
+      </p:sp>
+      <p:sp>
+        <p:nvSpPr>
+          <p:cNvPr id="7" name="CaixaDeTexto 6">
+            <a:extLst>
+              <a:ext uri="{FF2B5EF4-FFF2-40B4-BE49-F238E27FC236}">
+                <a16:creationId xmlns:a16="http://schemas.microsoft.com/office/drawing/2014/main" id="{8ED0A782-13C3-4B4B-B3A8-69DA23F1F64E}"/>
+              </a:ext>
+            </a:extLst>
+          </p:cNvPr>
+          <p:cNvSpPr txBox="1"/>
+          <p:nvPr/>
+        </p:nvSpPr>
+        <p:spPr>
+          <a:xfrm>
+            <a:off x="9897974" y="6457890"/>
+            <a:ext cx="2294026" cy="400110"/>
+          </a:xfrm>
+          <a:prstGeom prst="rect">
+            <a:avLst/>
+          </a:prstGeom>
+          <a:noFill/>
+        </p:spPr>
+        <p:txBody>
+          <a:bodyPr wrap="none" rtlCol="0">
+            <a:spAutoFit/>
+          </a:bodyPr>
+          <a:lstStyle/>
+          <a:p>
+            <a:r>
+              <a:rPr lang="en-US" sz="2000" dirty="0">
+                <a:solidFill>
+                  <a:schemeClr val="accent1">
+                    <a:lumMod val="50000"/>
+                  </a:schemeClr>
+                </a:solidFill>
+              </a:rPr>
+              <a:t>Projecto Final - UML</a:t>
+            </a:r>
+            <a:endParaRPr lang="pt-PT" sz="2000" dirty="0">
+              <a:solidFill>
+                <a:schemeClr val="accent1">
+                  <a:lumMod val="50000"/>
+                </a:schemeClr>
+              </a:solidFill>
+            </a:endParaRPr>
+          </a:p>
+        </p:txBody>
+      </p:sp>
+      <p:sp>
+        <p:nvSpPr>
+          <p:cNvPr id="2" name="CaixaDeTexto 1">
+            <a:extLst>
+              <a:ext uri="{FF2B5EF4-FFF2-40B4-BE49-F238E27FC236}">
+                <a16:creationId xmlns:a16="http://schemas.microsoft.com/office/drawing/2014/main" id="{DED64B3C-BD7E-49D6-9BF6-FB29863CD7DD}"/>
+              </a:ext>
+            </a:extLst>
+          </p:cNvPr>
+          <p:cNvSpPr txBox="1"/>
+          <p:nvPr/>
+        </p:nvSpPr>
+        <p:spPr>
+          <a:xfrm>
+            <a:off x="3209925" y="111930"/>
+            <a:ext cx="8838364" cy="461665"/>
+          </a:xfrm>
+          <a:prstGeom prst="rect">
+            <a:avLst/>
+          </a:prstGeom>
+        </p:spPr>
+        <p:style>
+          <a:lnRef idx="0">
+            <a:schemeClr val="accent4"/>
+          </a:lnRef>
+          <a:fillRef idx="3">
+            <a:schemeClr val="accent4"/>
+          </a:fillRef>
+          <a:effectRef idx="3">
+            <a:schemeClr val="accent4"/>
+          </a:effectRef>
+          <a:fontRef idx="minor">
+            <a:schemeClr val="lt1"/>
+          </a:fontRef>
+        </p:style>
+        <p:txBody>
+          <a:bodyPr wrap="square" rtlCol="0">
+            <a:spAutoFit/>
+          </a:bodyPr>
+          <a:lstStyle/>
+          <a:p>
+            <a:pPr algn="ctr"/>
+            <a:r>
+              <a:rPr lang="en-US" sz="2400" dirty="0">
+                <a:solidFill>
+                  <a:schemeClr val="accent1">
+                    <a:lumMod val="50000"/>
+                  </a:schemeClr>
+                </a:solidFill>
+              </a:rPr>
+              <a:t>Arquitetura Projecto</a:t>
+            </a:r>
+            <a:endParaRPr lang="pt-PT" sz="2400" dirty="0">
+              <a:solidFill>
+                <a:schemeClr val="accent1">
+                  <a:lumMod val="50000"/>
+                </a:schemeClr>
+              </a:solidFill>
+            </a:endParaRPr>
+          </a:p>
+        </p:txBody>
+      </p:sp>
+      <p:pic>
+        <p:nvPicPr>
+          <p:cNvPr id="4" name="Imagem 3">
+            <a:extLst>
+              <a:ext uri="{FF2B5EF4-FFF2-40B4-BE49-F238E27FC236}">
+                <a16:creationId xmlns:a16="http://schemas.microsoft.com/office/drawing/2014/main" id="{320BF36E-C546-40D9-94DE-F29E46A11334}"/>
+              </a:ext>
+            </a:extLst>
+          </p:cNvPr>
+          <p:cNvPicPr>
+            <a:picLocks noChangeAspect="1"/>
+          </p:cNvPicPr>
+          <p:nvPr/>
+        </p:nvPicPr>
+        <p:blipFill>
+          <a:blip r:embed="rId3">
+            <a:extLst>
+              <a:ext uri="{28A0092B-C50C-407E-A947-70E740481C1C}">
+                <a14:useLocalDpi xmlns:a14="http://schemas.microsoft.com/office/drawing/2010/main" val="0"/>
+              </a:ext>
+            </a:extLst>
+          </a:blip>
+          <a:stretch>
+            <a:fillRect/>
+          </a:stretch>
+        </p:blipFill>
+        <p:spPr>
+          <a:xfrm>
+            <a:off x="3047345" y="1224488"/>
+            <a:ext cx="7715250" cy="5196761"/>
           </a:xfrm>
           <a:prstGeom prst="rect">
             <a:avLst/>

</xml_diff>

<commit_message>
Melhorias no Power point UML
</commit_message>
<xml_diff>
--- a/04 - Docs/01 - Project Manager/08 - UML/00 - Apresentação UML/UML Grupo 3.pptx
+++ b/04 - Docs/01 - Project Manager/08 - UML/00 - Apresentação UML/UML Grupo 3.pptx
@@ -3485,8 +3485,8 @@
         </p:nvSpPr>
         <p:spPr>
           <a:xfrm>
-            <a:off x="9897974" y="6457890"/>
-            <a:ext cx="2294026" cy="400110"/>
+            <a:off x="9301337" y="6457890"/>
+            <a:ext cx="2890663" cy="400110"/>
           </a:xfrm>
           <a:prstGeom prst="rect">
             <a:avLst/>
@@ -3507,7 +3507,7 @@
                   </a:schemeClr>
                 </a:solidFill>
               </a:rPr>
-              <a:t>Projecto Final - UML</a:t>
+              <a:t>Projecto Final SPAD - UML</a:t>
             </a:r>
             <a:endParaRPr lang="pt-PT" sz="2000" dirty="0">
               <a:solidFill>
@@ -3547,8 +3547,8 @@
         </p:blipFill>
         <p:spPr>
           <a:xfrm>
-            <a:off x="3614918" y="1624013"/>
-            <a:ext cx="4962164" cy="3609974"/>
+            <a:off x="4043694" y="1935948"/>
+            <a:ext cx="4104611" cy="2986104"/>
           </a:xfrm>
           <a:prstGeom prst="rect">
             <a:avLst/>
@@ -3701,54 +3701,6 @@
       </p:sp>
       <p:sp>
         <p:nvSpPr>
-          <p:cNvPr id="7" name="CaixaDeTexto 6">
-            <a:extLst>
-              <a:ext uri="{FF2B5EF4-FFF2-40B4-BE49-F238E27FC236}">
-                <a16:creationId xmlns:a16="http://schemas.microsoft.com/office/drawing/2014/main" id="{8ED0A782-13C3-4B4B-B3A8-69DA23F1F64E}"/>
-              </a:ext>
-            </a:extLst>
-          </p:cNvPr>
-          <p:cNvSpPr txBox="1"/>
-          <p:nvPr/>
-        </p:nvSpPr>
-        <p:spPr>
-          <a:xfrm>
-            <a:off x="9897974" y="6457890"/>
-            <a:ext cx="2294026" cy="400110"/>
-          </a:xfrm>
-          <a:prstGeom prst="rect">
-            <a:avLst/>
-          </a:prstGeom>
-          <a:noFill/>
-        </p:spPr>
-        <p:txBody>
-          <a:bodyPr wrap="none" rtlCol="0">
-            <a:spAutoFit/>
-          </a:bodyPr>
-          <a:lstStyle/>
-          <a:p>
-            <a:r>
-              <a:rPr lang="en-US" sz="2000" dirty="0">
-                <a:solidFill>
-                  <a:schemeClr val="accent1">
-                    <a:lumMod val="50000"/>
-                  </a:schemeClr>
-                </a:solidFill>
-              </a:rPr>
-              <a:t>Projecto Final - UML</a:t>
-            </a:r>
-            <a:endParaRPr lang="pt-PT" sz="2000" dirty="0">
-              <a:solidFill>
-                <a:schemeClr val="accent1">
-                  <a:lumMod val="50000"/>
-                </a:schemeClr>
-              </a:solidFill>
-            </a:endParaRPr>
-          </a:p>
-        </p:txBody>
-      </p:sp>
-      <p:sp>
-        <p:nvSpPr>
           <p:cNvPr id="2" name="CaixaDeTexto 1">
             <a:extLst>
               <a:ext uri="{FF2B5EF4-FFF2-40B4-BE49-F238E27FC236}">
@@ -3946,6 +3898,54 @@
               </a:rPr>
               <a:t>Contextualização</a:t>
             </a:r>
+          </a:p>
+        </p:txBody>
+      </p:sp>
+      <p:sp>
+        <p:nvSpPr>
+          <p:cNvPr id="9" name="CaixaDeTexto 8">
+            <a:extLst>
+              <a:ext uri="{FF2B5EF4-FFF2-40B4-BE49-F238E27FC236}">
+                <a16:creationId xmlns:a16="http://schemas.microsoft.com/office/drawing/2014/main" id="{57E20148-8DBA-4CE4-A21D-91C4A866F103}"/>
+              </a:ext>
+            </a:extLst>
+          </p:cNvPr>
+          <p:cNvSpPr txBox="1"/>
+          <p:nvPr/>
+        </p:nvSpPr>
+        <p:spPr>
+          <a:xfrm>
+            <a:off x="9301337" y="6457890"/>
+            <a:ext cx="2890663" cy="400110"/>
+          </a:xfrm>
+          <a:prstGeom prst="rect">
+            <a:avLst/>
+          </a:prstGeom>
+          <a:noFill/>
+        </p:spPr>
+        <p:txBody>
+          <a:bodyPr wrap="none" rtlCol="0">
+            <a:spAutoFit/>
+          </a:bodyPr>
+          <a:lstStyle/>
+          <a:p>
+            <a:r>
+              <a:rPr lang="en-US" sz="2000" dirty="0">
+                <a:solidFill>
+                  <a:schemeClr val="accent1">
+                    <a:lumMod val="50000"/>
+                  </a:schemeClr>
+                </a:solidFill>
+              </a:rPr>
+              <a:t>Projecto Final SPAD - UML</a:t>
+            </a:r>
+            <a:endParaRPr lang="pt-PT" sz="2000" dirty="0">
+              <a:solidFill>
+                <a:schemeClr val="accent1">
+                  <a:lumMod val="50000"/>
+                </a:schemeClr>
+              </a:solidFill>
+            </a:endParaRPr>
           </a:p>
         </p:txBody>
       </p:sp>
@@ -4093,54 +4093,6 @@
           </a:p>
         </p:txBody>
       </p:sp>
-      <p:sp>
-        <p:nvSpPr>
-          <p:cNvPr id="7" name="CaixaDeTexto 6">
-            <a:extLst>
-              <a:ext uri="{FF2B5EF4-FFF2-40B4-BE49-F238E27FC236}">
-                <a16:creationId xmlns:a16="http://schemas.microsoft.com/office/drawing/2014/main" id="{8ED0A782-13C3-4B4B-B3A8-69DA23F1F64E}"/>
-              </a:ext>
-            </a:extLst>
-          </p:cNvPr>
-          <p:cNvSpPr txBox="1"/>
-          <p:nvPr/>
-        </p:nvSpPr>
-        <p:spPr>
-          <a:xfrm>
-            <a:off x="9897974" y="6460893"/>
-            <a:ext cx="2294026" cy="400110"/>
-          </a:xfrm>
-          <a:prstGeom prst="rect">
-            <a:avLst/>
-          </a:prstGeom>
-          <a:noFill/>
-        </p:spPr>
-        <p:txBody>
-          <a:bodyPr wrap="none" rtlCol="0">
-            <a:spAutoFit/>
-          </a:bodyPr>
-          <a:lstStyle/>
-          <a:p>
-            <a:r>
-              <a:rPr lang="en-US" sz="2000" dirty="0">
-                <a:solidFill>
-                  <a:schemeClr val="accent1">
-                    <a:lumMod val="50000"/>
-                  </a:schemeClr>
-                </a:solidFill>
-              </a:rPr>
-              <a:t>Projecto Final - UML</a:t>
-            </a:r>
-            <a:endParaRPr lang="pt-PT" sz="2000" dirty="0">
-              <a:solidFill>
-                <a:schemeClr val="accent1">
-                  <a:lumMod val="50000"/>
-                </a:schemeClr>
-              </a:solidFill>
-            </a:endParaRPr>
-          </a:p>
-        </p:txBody>
-      </p:sp>
       <p:pic>
         <p:nvPicPr>
           <p:cNvPr id="4" name="Imagem 3">
@@ -4230,6 +4182,54 @@
               <a:t>Use Cases</a:t>
             </a:r>
             <a:endParaRPr lang="pt-PT" sz="2400" dirty="0">
+              <a:solidFill>
+                <a:schemeClr val="accent1">
+                  <a:lumMod val="50000"/>
+                </a:schemeClr>
+              </a:solidFill>
+            </a:endParaRPr>
+          </a:p>
+        </p:txBody>
+      </p:sp>
+      <p:sp>
+        <p:nvSpPr>
+          <p:cNvPr id="9" name="CaixaDeTexto 8">
+            <a:extLst>
+              <a:ext uri="{FF2B5EF4-FFF2-40B4-BE49-F238E27FC236}">
+                <a16:creationId xmlns:a16="http://schemas.microsoft.com/office/drawing/2014/main" id="{C0413E2F-B255-49E4-9311-14B69B78DE5B}"/>
+              </a:ext>
+            </a:extLst>
+          </p:cNvPr>
+          <p:cNvSpPr txBox="1"/>
+          <p:nvPr/>
+        </p:nvSpPr>
+        <p:spPr>
+          <a:xfrm>
+            <a:off x="9301337" y="6457890"/>
+            <a:ext cx="2890663" cy="400110"/>
+          </a:xfrm>
+          <a:prstGeom prst="rect">
+            <a:avLst/>
+          </a:prstGeom>
+          <a:noFill/>
+        </p:spPr>
+        <p:txBody>
+          <a:bodyPr wrap="none" rtlCol="0">
+            <a:spAutoFit/>
+          </a:bodyPr>
+          <a:lstStyle/>
+          <a:p>
+            <a:r>
+              <a:rPr lang="en-US" sz="2000" dirty="0">
+                <a:solidFill>
+                  <a:schemeClr val="accent1">
+                    <a:lumMod val="50000"/>
+                  </a:schemeClr>
+                </a:solidFill>
+              </a:rPr>
+              <a:t>Projecto Final SPAD - UML</a:t>
+            </a:r>
+            <a:endParaRPr lang="pt-PT" sz="2000" dirty="0">
               <a:solidFill>
                 <a:schemeClr val="accent1">
                   <a:lumMod val="50000"/>
@@ -4383,54 +4383,6 @@
           </a:p>
         </p:txBody>
       </p:sp>
-      <p:sp>
-        <p:nvSpPr>
-          <p:cNvPr id="7" name="CaixaDeTexto 6">
-            <a:extLst>
-              <a:ext uri="{FF2B5EF4-FFF2-40B4-BE49-F238E27FC236}">
-                <a16:creationId xmlns:a16="http://schemas.microsoft.com/office/drawing/2014/main" id="{8ED0A782-13C3-4B4B-B3A8-69DA23F1F64E}"/>
-              </a:ext>
-            </a:extLst>
-          </p:cNvPr>
-          <p:cNvSpPr txBox="1"/>
-          <p:nvPr/>
-        </p:nvSpPr>
-        <p:spPr>
-          <a:xfrm>
-            <a:off x="9897974" y="6457890"/>
-            <a:ext cx="2294026" cy="400110"/>
-          </a:xfrm>
-          <a:prstGeom prst="rect">
-            <a:avLst/>
-          </a:prstGeom>
-          <a:noFill/>
-        </p:spPr>
-        <p:txBody>
-          <a:bodyPr wrap="none" rtlCol="0">
-            <a:spAutoFit/>
-          </a:bodyPr>
-          <a:lstStyle/>
-          <a:p>
-            <a:r>
-              <a:rPr lang="en-US" sz="2000" dirty="0">
-                <a:solidFill>
-                  <a:schemeClr val="accent1">
-                    <a:lumMod val="50000"/>
-                  </a:schemeClr>
-                </a:solidFill>
-              </a:rPr>
-              <a:t>Projecto Final - UML</a:t>
-            </a:r>
-            <a:endParaRPr lang="pt-PT" sz="2000" dirty="0">
-              <a:solidFill>
-                <a:schemeClr val="accent1">
-                  <a:lumMod val="50000"/>
-                </a:schemeClr>
-              </a:solidFill>
-            </a:endParaRPr>
-          </a:p>
-        </p:txBody>
-      </p:sp>
       <p:pic>
         <p:nvPicPr>
           <p:cNvPr id="8" name="Imagem 7">
@@ -4520,6 +4472,54 @@
               <a:t>Modelo de Dados</a:t>
             </a:r>
             <a:endParaRPr lang="pt-PT" sz="2400" dirty="0">
+              <a:solidFill>
+                <a:schemeClr val="accent1">
+                  <a:lumMod val="50000"/>
+                </a:schemeClr>
+              </a:solidFill>
+            </a:endParaRPr>
+          </a:p>
+        </p:txBody>
+      </p:sp>
+      <p:sp>
+        <p:nvSpPr>
+          <p:cNvPr id="10" name="CaixaDeTexto 9">
+            <a:extLst>
+              <a:ext uri="{FF2B5EF4-FFF2-40B4-BE49-F238E27FC236}">
+                <a16:creationId xmlns:a16="http://schemas.microsoft.com/office/drawing/2014/main" id="{F709570B-882A-456C-BD9F-E689D289AD7F}"/>
+              </a:ext>
+            </a:extLst>
+          </p:cNvPr>
+          <p:cNvSpPr txBox="1"/>
+          <p:nvPr/>
+        </p:nvSpPr>
+        <p:spPr>
+          <a:xfrm>
+            <a:off x="9301337" y="6457890"/>
+            <a:ext cx="2890663" cy="400110"/>
+          </a:xfrm>
+          <a:prstGeom prst="rect">
+            <a:avLst/>
+          </a:prstGeom>
+          <a:noFill/>
+        </p:spPr>
+        <p:txBody>
+          <a:bodyPr wrap="none" rtlCol="0">
+            <a:spAutoFit/>
+          </a:bodyPr>
+          <a:lstStyle/>
+          <a:p>
+            <a:r>
+              <a:rPr lang="en-US" sz="2000" dirty="0">
+                <a:solidFill>
+                  <a:schemeClr val="accent1">
+                    <a:lumMod val="50000"/>
+                  </a:schemeClr>
+                </a:solidFill>
+              </a:rPr>
+              <a:t>Projecto Final SPAD - UML</a:t>
+            </a:r>
+            <a:endParaRPr lang="pt-PT" sz="2000" dirty="0">
               <a:solidFill>
                 <a:schemeClr val="accent1">
                   <a:lumMod val="50000"/>
@@ -4673,54 +4673,6 @@
           </a:p>
         </p:txBody>
       </p:sp>
-      <p:sp>
-        <p:nvSpPr>
-          <p:cNvPr id="7" name="CaixaDeTexto 6">
-            <a:extLst>
-              <a:ext uri="{FF2B5EF4-FFF2-40B4-BE49-F238E27FC236}">
-                <a16:creationId xmlns:a16="http://schemas.microsoft.com/office/drawing/2014/main" id="{8ED0A782-13C3-4B4B-B3A8-69DA23F1F64E}"/>
-              </a:ext>
-            </a:extLst>
-          </p:cNvPr>
-          <p:cNvSpPr txBox="1"/>
-          <p:nvPr/>
-        </p:nvSpPr>
-        <p:spPr>
-          <a:xfrm>
-            <a:off x="9897974" y="6457890"/>
-            <a:ext cx="2294026" cy="400110"/>
-          </a:xfrm>
-          <a:prstGeom prst="rect">
-            <a:avLst/>
-          </a:prstGeom>
-          <a:noFill/>
-        </p:spPr>
-        <p:txBody>
-          <a:bodyPr wrap="none" rtlCol="0">
-            <a:spAutoFit/>
-          </a:bodyPr>
-          <a:lstStyle/>
-          <a:p>
-            <a:r>
-              <a:rPr lang="en-US" sz="2000" dirty="0">
-                <a:solidFill>
-                  <a:schemeClr val="accent1">
-                    <a:lumMod val="50000"/>
-                  </a:schemeClr>
-                </a:solidFill>
-              </a:rPr>
-              <a:t>Projecto Final - UML</a:t>
-            </a:r>
-            <a:endParaRPr lang="pt-PT" sz="2000" dirty="0">
-              <a:solidFill>
-                <a:schemeClr val="accent1">
-                  <a:lumMod val="50000"/>
-                </a:schemeClr>
-              </a:solidFill>
-            </a:endParaRPr>
-          </a:p>
-        </p:txBody>
-      </p:sp>
       <p:pic>
         <p:nvPicPr>
           <p:cNvPr id="4" name="Imagem 3">
@@ -4810,6 +4762,54 @@
               <a:t>Dicionário de Contexto</a:t>
             </a:r>
             <a:endParaRPr lang="pt-PT" sz="2400" dirty="0">
+              <a:solidFill>
+                <a:schemeClr val="accent1">
+                  <a:lumMod val="50000"/>
+                </a:schemeClr>
+              </a:solidFill>
+            </a:endParaRPr>
+          </a:p>
+        </p:txBody>
+      </p:sp>
+      <p:sp>
+        <p:nvSpPr>
+          <p:cNvPr id="8" name="CaixaDeTexto 7">
+            <a:extLst>
+              <a:ext uri="{FF2B5EF4-FFF2-40B4-BE49-F238E27FC236}">
+                <a16:creationId xmlns:a16="http://schemas.microsoft.com/office/drawing/2014/main" id="{0AB85698-C21F-4E54-B4FE-C3F6F024B75A}"/>
+              </a:ext>
+            </a:extLst>
+          </p:cNvPr>
+          <p:cNvSpPr txBox="1"/>
+          <p:nvPr/>
+        </p:nvSpPr>
+        <p:spPr>
+          <a:xfrm>
+            <a:off x="9301337" y="6457890"/>
+            <a:ext cx="2890663" cy="400110"/>
+          </a:xfrm>
+          <a:prstGeom prst="rect">
+            <a:avLst/>
+          </a:prstGeom>
+          <a:noFill/>
+        </p:spPr>
+        <p:txBody>
+          <a:bodyPr wrap="none" rtlCol="0">
+            <a:spAutoFit/>
+          </a:bodyPr>
+          <a:lstStyle/>
+          <a:p>
+            <a:r>
+              <a:rPr lang="en-US" sz="2000" dirty="0">
+                <a:solidFill>
+                  <a:schemeClr val="accent1">
+                    <a:lumMod val="50000"/>
+                  </a:schemeClr>
+                </a:solidFill>
+              </a:rPr>
+              <a:t>Projecto Final SPAD - UML</a:t>
+            </a:r>
+            <a:endParaRPr lang="pt-PT" sz="2000" dirty="0">
               <a:solidFill>
                 <a:schemeClr val="accent1">
                   <a:lumMod val="50000"/>
@@ -4965,54 +4965,6 @@
       </p:sp>
       <p:sp>
         <p:nvSpPr>
-          <p:cNvPr id="7" name="CaixaDeTexto 6">
-            <a:extLst>
-              <a:ext uri="{FF2B5EF4-FFF2-40B4-BE49-F238E27FC236}">
-                <a16:creationId xmlns:a16="http://schemas.microsoft.com/office/drawing/2014/main" id="{8ED0A782-13C3-4B4B-B3A8-69DA23F1F64E}"/>
-              </a:ext>
-            </a:extLst>
-          </p:cNvPr>
-          <p:cNvSpPr txBox="1"/>
-          <p:nvPr/>
-        </p:nvSpPr>
-        <p:spPr>
-          <a:xfrm>
-            <a:off x="9897974" y="6457890"/>
-            <a:ext cx="2294026" cy="400110"/>
-          </a:xfrm>
-          <a:prstGeom prst="rect">
-            <a:avLst/>
-          </a:prstGeom>
-          <a:noFill/>
-        </p:spPr>
-        <p:txBody>
-          <a:bodyPr wrap="none" rtlCol="0">
-            <a:spAutoFit/>
-          </a:bodyPr>
-          <a:lstStyle/>
-          <a:p>
-            <a:r>
-              <a:rPr lang="en-US" sz="2000" dirty="0">
-                <a:solidFill>
-                  <a:schemeClr val="accent1">
-                    <a:lumMod val="50000"/>
-                  </a:schemeClr>
-                </a:solidFill>
-              </a:rPr>
-              <a:t>Projecto Final - UML</a:t>
-            </a:r>
-            <a:endParaRPr lang="pt-PT" sz="2000" dirty="0">
-              <a:solidFill>
-                <a:schemeClr val="accent1">
-                  <a:lumMod val="50000"/>
-                </a:schemeClr>
-              </a:solidFill>
-            </a:endParaRPr>
-          </a:p>
-        </p:txBody>
-      </p:sp>
-      <p:sp>
-        <p:nvSpPr>
           <p:cNvPr id="2" name="CaixaDeTexto 1">
             <a:extLst>
               <a:ext uri="{FF2B5EF4-FFF2-40B4-BE49-F238E27FC236}">
@@ -5109,6 +5061,54 @@
           </a:prstGeom>
         </p:spPr>
       </p:pic>
+      <p:sp>
+        <p:nvSpPr>
+          <p:cNvPr id="9" name="CaixaDeTexto 8">
+            <a:extLst>
+              <a:ext uri="{FF2B5EF4-FFF2-40B4-BE49-F238E27FC236}">
+                <a16:creationId xmlns:a16="http://schemas.microsoft.com/office/drawing/2014/main" id="{8262269A-F309-4F9F-AB1D-7DA7AEBC5D96}"/>
+              </a:ext>
+            </a:extLst>
+          </p:cNvPr>
+          <p:cNvSpPr txBox="1"/>
+          <p:nvPr/>
+        </p:nvSpPr>
+        <p:spPr>
+          <a:xfrm>
+            <a:off x="9301337" y="6457890"/>
+            <a:ext cx="2890663" cy="400110"/>
+          </a:xfrm>
+          <a:prstGeom prst="rect">
+            <a:avLst/>
+          </a:prstGeom>
+          <a:noFill/>
+        </p:spPr>
+        <p:txBody>
+          <a:bodyPr wrap="none" rtlCol="0">
+            <a:spAutoFit/>
+          </a:bodyPr>
+          <a:lstStyle/>
+          <a:p>
+            <a:r>
+              <a:rPr lang="en-US" sz="2000" dirty="0">
+                <a:solidFill>
+                  <a:schemeClr val="accent1">
+                    <a:lumMod val="50000"/>
+                  </a:schemeClr>
+                </a:solidFill>
+              </a:rPr>
+              <a:t>Projecto Final SPAD - UML</a:t>
+            </a:r>
+            <a:endParaRPr lang="pt-PT" sz="2000" dirty="0">
+              <a:solidFill>
+                <a:schemeClr val="accent1">
+                  <a:lumMod val="50000"/>
+                </a:schemeClr>
+              </a:solidFill>
+            </a:endParaRPr>
+          </a:p>
+        </p:txBody>
+      </p:sp>
     </p:spTree>
     <p:extLst>
       <p:ext uri="{BB962C8B-B14F-4D97-AF65-F5344CB8AC3E}">
@@ -5255,54 +5255,6 @@
       </p:sp>
       <p:sp>
         <p:nvSpPr>
-          <p:cNvPr id="7" name="CaixaDeTexto 6">
-            <a:extLst>
-              <a:ext uri="{FF2B5EF4-FFF2-40B4-BE49-F238E27FC236}">
-                <a16:creationId xmlns:a16="http://schemas.microsoft.com/office/drawing/2014/main" id="{8ED0A782-13C3-4B4B-B3A8-69DA23F1F64E}"/>
-              </a:ext>
-            </a:extLst>
-          </p:cNvPr>
-          <p:cNvSpPr txBox="1"/>
-          <p:nvPr/>
-        </p:nvSpPr>
-        <p:spPr>
-          <a:xfrm>
-            <a:off x="9897974" y="6457890"/>
-            <a:ext cx="2294026" cy="400110"/>
-          </a:xfrm>
-          <a:prstGeom prst="rect">
-            <a:avLst/>
-          </a:prstGeom>
-          <a:noFill/>
-        </p:spPr>
-        <p:txBody>
-          <a:bodyPr wrap="none" rtlCol="0">
-            <a:spAutoFit/>
-          </a:bodyPr>
-          <a:lstStyle/>
-          <a:p>
-            <a:r>
-              <a:rPr lang="en-US" sz="2000" dirty="0">
-                <a:solidFill>
-                  <a:schemeClr val="accent1">
-                    <a:lumMod val="50000"/>
-                  </a:schemeClr>
-                </a:solidFill>
-              </a:rPr>
-              <a:t>Projecto Final - UML</a:t>
-            </a:r>
-            <a:endParaRPr lang="pt-PT" sz="2000" dirty="0">
-              <a:solidFill>
-                <a:schemeClr val="accent1">
-                  <a:lumMod val="50000"/>
-                </a:schemeClr>
-              </a:solidFill>
-            </a:endParaRPr>
-          </a:p>
-        </p:txBody>
-      </p:sp>
-      <p:sp>
-        <p:nvSpPr>
           <p:cNvPr id="2" name="CaixaDeTexto 1">
             <a:extLst>
               <a:ext uri="{FF2B5EF4-FFF2-40B4-BE49-F238E27FC236}">
@@ -5419,6 +5371,54 @@
           </a:prstGeom>
         </p:spPr>
       </p:pic>
+      <p:sp>
+        <p:nvSpPr>
+          <p:cNvPr id="8" name="CaixaDeTexto 7">
+            <a:extLst>
+              <a:ext uri="{FF2B5EF4-FFF2-40B4-BE49-F238E27FC236}">
+                <a16:creationId xmlns:a16="http://schemas.microsoft.com/office/drawing/2014/main" id="{2A5A36C4-47E9-4F0E-B209-F41870743278}"/>
+              </a:ext>
+            </a:extLst>
+          </p:cNvPr>
+          <p:cNvSpPr txBox="1"/>
+          <p:nvPr/>
+        </p:nvSpPr>
+        <p:spPr>
+          <a:xfrm>
+            <a:off x="9301337" y="6457890"/>
+            <a:ext cx="2890663" cy="400110"/>
+          </a:xfrm>
+          <a:prstGeom prst="rect">
+            <a:avLst/>
+          </a:prstGeom>
+          <a:noFill/>
+        </p:spPr>
+        <p:txBody>
+          <a:bodyPr wrap="none" rtlCol="0">
+            <a:spAutoFit/>
+          </a:bodyPr>
+          <a:lstStyle/>
+          <a:p>
+            <a:r>
+              <a:rPr lang="en-US" sz="2000" dirty="0">
+                <a:solidFill>
+                  <a:schemeClr val="accent1">
+                    <a:lumMod val="50000"/>
+                  </a:schemeClr>
+                </a:solidFill>
+              </a:rPr>
+              <a:t>Projecto Final SPAD - UML</a:t>
+            </a:r>
+            <a:endParaRPr lang="pt-PT" sz="2000" dirty="0">
+              <a:solidFill>
+                <a:schemeClr val="accent1">
+                  <a:lumMod val="50000"/>
+                </a:schemeClr>
+              </a:solidFill>
+            </a:endParaRPr>
+          </a:p>
+        </p:txBody>
+      </p:sp>
     </p:spTree>
     <p:extLst>
       <p:ext uri="{BB962C8B-B14F-4D97-AF65-F5344CB8AC3E}">
@@ -5565,54 +5565,6 @@
       </p:sp>
       <p:sp>
         <p:nvSpPr>
-          <p:cNvPr id="7" name="CaixaDeTexto 6">
-            <a:extLst>
-              <a:ext uri="{FF2B5EF4-FFF2-40B4-BE49-F238E27FC236}">
-                <a16:creationId xmlns:a16="http://schemas.microsoft.com/office/drawing/2014/main" id="{8ED0A782-13C3-4B4B-B3A8-69DA23F1F64E}"/>
-              </a:ext>
-            </a:extLst>
-          </p:cNvPr>
-          <p:cNvSpPr txBox="1"/>
-          <p:nvPr/>
-        </p:nvSpPr>
-        <p:spPr>
-          <a:xfrm>
-            <a:off x="9897974" y="6457890"/>
-            <a:ext cx="2294026" cy="400110"/>
-          </a:xfrm>
-          <a:prstGeom prst="rect">
-            <a:avLst/>
-          </a:prstGeom>
-          <a:noFill/>
-        </p:spPr>
-        <p:txBody>
-          <a:bodyPr wrap="none" rtlCol="0">
-            <a:spAutoFit/>
-          </a:bodyPr>
-          <a:lstStyle/>
-          <a:p>
-            <a:r>
-              <a:rPr lang="en-US" sz="2000" dirty="0">
-                <a:solidFill>
-                  <a:schemeClr val="accent1">
-                    <a:lumMod val="50000"/>
-                  </a:schemeClr>
-                </a:solidFill>
-              </a:rPr>
-              <a:t>Projecto Final - UML</a:t>
-            </a:r>
-            <a:endParaRPr lang="pt-PT" sz="2000" dirty="0">
-              <a:solidFill>
-                <a:schemeClr val="accent1">
-                  <a:lumMod val="50000"/>
-                </a:schemeClr>
-              </a:solidFill>
-            </a:endParaRPr>
-          </a:p>
-        </p:txBody>
-      </p:sp>
-      <p:sp>
-        <p:nvSpPr>
           <p:cNvPr id="2" name="CaixaDeTexto 1">
             <a:extLst>
               <a:ext uri="{FF2B5EF4-FFF2-40B4-BE49-F238E27FC236}">
@@ -5729,6 +5681,54 @@
           </a:prstGeom>
         </p:spPr>
       </p:pic>
+      <p:sp>
+        <p:nvSpPr>
+          <p:cNvPr id="9" name="CaixaDeTexto 8">
+            <a:extLst>
+              <a:ext uri="{FF2B5EF4-FFF2-40B4-BE49-F238E27FC236}">
+                <a16:creationId xmlns:a16="http://schemas.microsoft.com/office/drawing/2014/main" id="{379F74CD-C452-4201-B127-34544A496AC2}"/>
+              </a:ext>
+            </a:extLst>
+          </p:cNvPr>
+          <p:cNvSpPr txBox="1"/>
+          <p:nvPr/>
+        </p:nvSpPr>
+        <p:spPr>
+          <a:xfrm>
+            <a:off x="9301337" y="6457890"/>
+            <a:ext cx="2890663" cy="400110"/>
+          </a:xfrm>
+          <a:prstGeom prst="rect">
+            <a:avLst/>
+          </a:prstGeom>
+          <a:noFill/>
+        </p:spPr>
+        <p:txBody>
+          <a:bodyPr wrap="none" rtlCol="0">
+            <a:spAutoFit/>
+          </a:bodyPr>
+          <a:lstStyle/>
+          <a:p>
+            <a:r>
+              <a:rPr lang="en-US" sz="2000" dirty="0">
+                <a:solidFill>
+                  <a:schemeClr val="accent1">
+                    <a:lumMod val="50000"/>
+                  </a:schemeClr>
+                </a:solidFill>
+              </a:rPr>
+              <a:t>Projecto Final SPAD - UML</a:t>
+            </a:r>
+            <a:endParaRPr lang="pt-PT" sz="2000" dirty="0">
+              <a:solidFill>
+                <a:schemeClr val="accent1">
+                  <a:lumMod val="50000"/>
+                </a:schemeClr>
+              </a:solidFill>
+            </a:endParaRPr>
+          </a:p>
+        </p:txBody>
+      </p:sp>
     </p:spTree>
     <p:extLst>
       <p:ext uri="{BB962C8B-B14F-4D97-AF65-F5344CB8AC3E}">
@@ -5875,54 +5875,6 @@
       </p:sp>
       <p:sp>
         <p:nvSpPr>
-          <p:cNvPr id="7" name="CaixaDeTexto 6">
-            <a:extLst>
-              <a:ext uri="{FF2B5EF4-FFF2-40B4-BE49-F238E27FC236}">
-                <a16:creationId xmlns:a16="http://schemas.microsoft.com/office/drawing/2014/main" id="{8ED0A782-13C3-4B4B-B3A8-69DA23F1F64E}"/>
-              </a:ext>
-            </a:extLst>
-          </p:cNvPr>
-          <p:cNvSpPr txBox="1"/>
-          <p:nvPr/>
-        </p:nvSpPr>
-        <p:spPr>
-          <a:xfrm>
-            <a:off x="9897974" y="6457890"/>
-            <a:ext cx="2294026" cy="400110"/>
-          </a:xfrm>
-          <a:prstGeom prst="rect">
-            <a:avLst/>
-          </a:prstGeom>
-          <a:noFill/>
-        </p:spPr>
-        <p:txBody>
-          <a:bodyPr wrap="none" rtlCol="0">
-            <a:spAutoFit/>
-          </a:bodyPr>
-          <a:lstStyle/>
-          <a:p>
-            <a:r>
-              <a:rPr lang="en-US" sz="2000" dirty="0">
-                <a:solidFill>
-                  <a:schemeClr val="accent1">
-                    <a:lumMod val="50000"/>
-                  </a:schemeClr>
-                </a:solidFill>
-              </a:rPr>
-              <a:t>Projecto Final - UML</a:t>
-            </a:r>
-            <a:endParaRPr lang="pt-PT" sz="2000" dirty="0">
-              <a:solidFill>
-                <a:schemeClr val="accent1">
-                  <a:lumMod val="50000"/>
-                </a:schemeClr>
-              </a:solidFill>
-            </a:endParaRPr>
-          </a:p>
-        </p:txBody>
-      </p:sp>
-      <p:sp>
-        <p:nvSpPr>
           <p:cNvPr id="2" name="CaixaDeTexto 1">
             <a:extLst>
               <a:ext uri="{FF2B5EF4-FFF2-40B4-BE49-F238E27FC236}">
@@ -6019,6 +5971,54 @@
           </a:prstGeom>
         </p:spPr>
       </p:pic>
+      <p:sp>
+        <p:nvSpPr>
+          <p:cNvPr id="8" name="CaixaDeTexto 7">
+            <a:extLst>
+              <a:ext uri="{FF2B5EF4-FFF2-40B4-BE49-F238E27FC236}">
+                <a16:creationId xmlns:a16="http://schemas.microsoft.com/office/drawing/2014/main" id="{2B420CC3-A1B8-44D0-BB96-B8329A082CEC}"/>
+              </a:ext>
+            </a:extLst>
+          </p:cNvPr>
+          <p:cNvSpPr txBox="1"/>
+          <p:nvPr/>
+        </p:nvSpPr>
+        <p:spPr>
+          <a:xfrm>
+            <a:off x="9301337" y="6457890"/>
+            <a:ext cx="2890663" cy="400110"/>
+          </a:xfrm>
+          <a:prstGeom prst="rect">
+            <a:avLst/>
+          </a:prstGeom>
+          <a:noFill/>
+        </p:spPr>
+        <p:txBody>
+          <a:bodyPr wrap="none" rtlCol="0">
+            <a:spAutoFit/>
+          </a:bodyPr>
+          <a:lstStyle/>
+          <a:p>
+            <a:r>
+              <a:rPr lang="en-US" sz="2000" dirty="0">
+                <a:solidFill>
+                  <a:schemeClr val="accent1">
+                    <a:lumMod val="50000"/>
+                  </a:schemeClr>
+                </a:solidFill>
+              </a:rPr>
+              <a:t>Projecto Final SPAD - UML</a:t>
+            </a:r>
+            <a:endParaRPr lang="pt-PT" sz="2000" dirty="0">
+              <a:solidFill>
+                <a:schemeClr val="accent1">
+                  <a:lumMod val="50000"/>
+                </a:schemeClr>
+              </a:solidFill>
+            </a:endParaRPr>
+          </a:p>
+        </p:txBody>
+      </p:sp>
     </p:spTree>
     <p:extLst>
       <p:ext uri="{BB962C8B-B14F-4D97-AF65-F5344CB8AC3E}">

</xml_diff>

<commit_message>
Update no power point uml
</commit_message>
<xml_diff>
--- a/04 - Docs/01 - Project Manager/08 - UML/00 - Apresentação UML/UML Grupo 3.pptx
+++ b/04 - Docs/01 - Project Manager/08 - UML/00 - Apresentação UML/UML Grupo 3.pptx
@@ -220,7 +220,7 @@
           <a:p>
             <a:fld id="{D7B64C4F-324A-4982-94AC-AE9956557606}" type="datetimeFigureOut">
               <a:rPr lang="pt-PT" smtClean="0"/>
-              <a:t>17/07/2018</a:t>
+              <a:t>18/07/2018</a:t>
             </a:fld>
             <a:endParaRPr lang="pt-PT"/>
           </a:p>
@@ -378,7 +378,7 @@
           <a:p>
             <a:fld id="{0466277E-5F40-4A85-8708-2D4643FF7332}" type="slidenum">
               <a:rPr lang="pt-PT" smtClean="0"/>
-              <a:t>‹#›</a:t>
+              <a:t>‹nº›</a:t>
             </a:fld>
             <a:endParaRPr lang="pt-PT"/>
           </a:p>
@@ -629,7 +629,7 @@
           <a:p>
             <a:fld id="{99DC0CBE-9660-45E0-9AC8-94D9D5004E70}" type="datetime1">
               <a:rPr lang="pt-PT" smtClean="0"/>
-              <a:t>17/07/2018</a:t>
+              <a:t>18/07/2018</a:t>
             </a:fld>
             <a:endParaRPr lang="pt-PT"/>
           </a:p>
@@ -671,7 +671,7 @@
           <a:p>
             <a:fld id="{0A841FAE-D82D-4024-9798-6BF498F22684}" type="slidenum">
               <a:rPr lang="pt-PT" smtClean="0"/>
-              <a:t>‹#›</a:t>
+              <a:t>‹nº›</a:t>
             </a:fld>
             <a:endParaRPr lang="pt-PT"/>
           </a:p>
@@ -799,7 +799,7 @@
           <a:p>
             <a:fld id="{CE106AF8-8308-488D-841E-77D2D6DE1AB3}" type="datetime1">
               <a:rPr lang="pt-PT" smtClean="0"/>
-              <a:t>17/07/2018</a:t>
+              <a:t>18/07/2018</a:t>
             </a:fld>
             <a:endParaRPr lang="pt-PT"/>
           </a:p>
@@ -841,7 +841,7 @@
           <a:p>
             <a:fld id="{0A841FAE-D82D-4024-9798-6BF498F22684}" type="slidenum">
               <a:rPr lang="pt-PT" smtClean="0"/>
-              <a:t>‹#›</a:t>
+              <a:t>‹nº›</a:t>
             </a:fld>
             <a:endParaRPr lang="pt-PT"/>
           </a:p>
@@ -979,7 +979,7 @@
           <a:p>
             <a:fld id="{6FA79DA2-4F16-448E-B24F-F88BCB80D202}" type="datetime1">
               <a:rPr lang="pt-PT" smtClean="0"/>
-              <a:t>17/07/2018</a:t>
+              <a:t>18/07/2018</a:t>
             </a:fld>
             <a:endParaRPr lang="pt-PT"/>
           </a:p>
@@ -1021,7 +1021,7 @@
           <a:p>
             <a:fld id="{0A841FAE-D82D-4024-9798-6BF498F22684}" type="slidenum">
               <a:rPr lang="pt-PT" smtClean="0"/>
-              <a:t>‹#›</a:t>
+              <a:t>‹nº›</a:t>
             </a:fld>
             <a:endParaRPr lang="pt-PT"/>
           </a:p>
@@ -1149,7 +1149,7 @@
           <a:p>
             <a:fld id="{4827E142-971D-4D2D-99F0-1DE707857DD0}" type="datetime1">
               <a:rPr lang="pt-PT" smtClean="0"/>
-              <a:t>17/07/2018</a:t>
+              <a:t>18/07/2018</a:t>
             </a:fld>
             <a:endParaRPr lang="pt-PT"/>
           </a:p>
@@ -1191,7 +1191,7 @@
           <a:p>
             <a:fld id="{0A841FAE-D82D-4024-9798-6BF498F22684}" type="slidenum">
               <a:rPr lang="pt-PT" smtClean="0"/>
-              <a:t>‹#›</a:t>
+              <a:t>‹nº›</a:t>
             </a:fld>
             <a:endParaRPr lang="pt-PT"/>
           </a:p>
@@ -1400,7 +1400,7 @@
           <a:p>
             <a:fld id="{B4FC198C-FF38-4CAB-A87F-857D864E4022}" type="datetime1">
               <a:rPr lang="pt-PT" smtClean="0"/>
-              <a:t>17/07/2018</a:t>
+              <a:t>18/07/2018</a:t>
             </a:fld>
             <a:endParaRPr lang="pt-PT"/>
           </a:p>
@@ -1442,7 +1442,7 @@
           <a:p>
             <a:fld id="{0A841FAE-D82D-4024-9798-6BF498F22684}" type="slidenum">
               <a:rPr lang="pt-PT" smtClean="0"/>
-              <a:t>‹#›</a:t>
+              <a:t>‹nº›</a:t>
             </a:fld>
             <a:endParaRPr lang="pt-PT"/>
           </a:p>
@@ -1632,7 +1632,7 @@
           <a:p>
             <a:fld id="{139CC831-A206-4156-ABBA-4D7D4D1EB4A9}" type="datetime1">
               <a:rPr lang="pt-PT" smtClean="0"/>
-              <a:t>17/07/2018</a:t>
+              <a:t>18/07/2018</a:t>
             </a:fld>
             <a:endParaRPr lang="pt-PT"/>
           </a:p>
@@ -1674,7 +1674,7 @@
           <a:p>
             <a:fld id="{0A841FAE-D82D-4024-9798-6BF498F22684}" type="slidenum">
               <a:rPr lang="pt-PT" smtClean="0"/>
-              <a:t>‹#›</a:t>
+              <a:t>‹nº›</a:t>
             </a:fld>
             <a:endParaRPr lang="pt-PT"/>
           </a:p>
@@ -1979,7 +1979,7 @@
           <a:p>
             <a:fld id="{D7CD316C-02BA-4B2B-AE1C-BFE2F87B650E}" type="datetime1">
               <a:rPr lang="pt-PT" smtClean="0"/>
-              <a:t>17/07/2018</a:t>
+              <a:t>18/07/2018</a:t>
             </a:fld>
             <a:endParaRPr lang="pt-PT"/>
           </a:p>
@@ -2021,7 +2021,7 @@
           <a:p>
             <a:fld id="{0A841FAE-D82D-4024-9798-6BF498F22684}" type="slidenum">
               <a:rPr lang="pt-PT" smtClean="0"/>
-              <a:t>‹#›</a:t>
+              <a:t>‹nº›</a:t>
             </a:fld>
             <a:endParaRPr lang="pt-PT"/>
           </a:p>
@@ -2097,7 +2097,7 @@
           <a:p>
             <a:fld id="{2FDD42CA-CE0A-4347-B6AE-870C0DC611E7}" type="datetime1">
               <a:rPr lang="pt-PT" smtClean="0"/>
-              <a:t>17/07/2018</a:t>
+              <a:t>18/07/2018</a:t>
             </a:fld>
             <a:endParaRPr lang="pt-PT"/>
           </a:p>
@@ -2139,7 +2139,7 @@
           <a:p>
             <a:fld id="{0A841FAE-D82D-4024-9798-6BF498F22684}" type="slidenum">
               <a:rPr lang="pt-PT" smtClean="0"/>
-              <a:t>‹#›</a:t>
+              <a:t>‹nº›</a:t>
             </a:fld>
             <a:endParaRPr lang="pt-PT"/>
           </a:p>
@@ -2215,7 +2215,7 @@
           <a:p>
             <a:fld id="{7A8A9DF7-D7B3-45E3-A219-C79C1A0767F3}" type="datetime1">
               <a:rPr lang="pt-PT" smtClean="0"/>
-              <a:t>17/07/2018</a:t>
+              <a:t>18/07/2018</a:t>
             </a:fld>
             <a:endParaRPr lang="pt-PT"/>
           </a:p>
@@ -2257,7 +2257,7 @@
           <a:p>
             <a:fld id="{0A841FAE-D82D-4024-9798-6BF498F22684}" type="slidenum">
               <a:rPr lang="pt-PT" smtClean="0"/>
-              <a:t>‹#›</a:t>
+              <a:t>‹nº›</a:t>
             </a:fld>
             <a:endParaRPr lang="pt-PT"/>
           </a:p>
@@ -2499,7 +2499,7 @@
           <a:p>
             <a:fld id="{A7C4C64E-965F-4B1C-A4E1-6E1896C3B1BE}" type="datetime1">
               <a:rPr lang="pt-PT" smtClean="0"/>
-              <a:t>17/07/2018</a:t>
+              <a:t>18/07/2018</a:t>
             </a:fld>
             <a:endParaRPr lang="pt-PT"/>
           </a:p>
@@ -2541,7 +2541,7 @@
           <a:p>
             <a:fld id="{0A841FAE-D82D-4024-9798-6BF498F22684}" type="slidenum">
               <a:rPr lang="pt-PT" smtClean="0"/>
-              <a:t>‹#›</a:t>
+              <a:t>‹nº›</a:t>
             </a:fld>
             <a:endParaRPr lang="pt-PT"/>
           </a:p>
@@ -2763,7 +2763,7 @@
           <a:p>
             <a:fld id="{062F934F-9B5B-46B2-BB65-8A64F7272566}" type="datetime1">
               <a:rPr lang="pt-PT" smtClean="0"/>
-              <a:t>17/07/2018</a:t>
+              <a:t>18/07/2018</a:t>
             </a:fld>
             <a:endParaRPr lang="pt-PT"/>
           </a:p>
@@ -2805,7 +2805,7 @@
           <a:p>
             <a:fld id="{0A841FAE-D82D-4024-9798-6BF498F22684}" type="slidenum">
               <a:rPr lang="pt-PT" smtClean="0"/>
-              <a:t>‹#›</a:t>
+              <a:t>‹nº›</a:t>
             </a:fld>
             <a:endParaRPr lang="pt-PT"/>
           </a:p>
@@ -2977,7 +2977,7 @@
           <a:p>
             <a:fld id="{B2E8085C-71E8-4D38-9CF6-AEBDB4F1CDC0}" type="datetime1">
               <a:rPr lang="pt-PT" smtClean="0"/>
-              <a:t>17/07/2018</a:t>
+              <a:t>18/07/2018</a:t>
             </a:fld>
             <a:endParaRPr lang="pt-PT"/>
           </a:p>
@@ -3056,7 +3056,7 @@
           <a:p>
             <a:fld id="{0A841FAE-D82D-4024-9798-6BF498F22684}" type="slidenum">
               <a:rPr lang="pt-PT" smtClean="0"/>
-              <a:t>‹#›</a:t>
+              <a:t>‹nº›</a:t>
             </a:fld>
             <a:endParaRPr lang="pt-PT"/>
           </a:p>
@@ -3580,13 +3580,6 @@
   <p:clrMapOvr>
     <a:masterClrMapping/>
   </p:clrMapOvr>
-  <p:timing>
-    <p:tnLst>
-      <p:par>
-        <p:cTn id="1" dur="indefinite" restart="never" nodeType="tmRoot"/>
-      </p:par>
-    </p:tnLst>
-  </p:timing>
 </p:sld>
 </file>
 
@@ -3771,20 +3764,10 @@
                   </a:schemeClr>
                 </a:solidFill>
               </a:rPr>
-              <a:t>Dicionário de </a:t>
-            </a:r>
-            <a:r>
-              <a:rPr lang="en-US" sz="2400" dirty="0" smtClean="0">
-                <a:solidFill>
-                  <a:schemeClr val="accent1">
-                    <a:lumMod val="50000"/>
-                  </a:schemeClr>
-                </a:solidFill>
-              </a:rPr>
-              <a:t>Dados - </a:t>
-            </a:r>
-            <a:r>
-              <a:rPr lang="en-US" sz="2400" dirty="0" err="1" smtClean="0">
+              <a:t>Dicionário de Dados - </a:t>
+            </a:r>
+            <a:r>
+              <a:rPr lang="en-US" sz="2400" dirty="0" err="1">
                 <a:solidFill>
                   <a:schemeClr val="accent1">
                     <a:lumMod val="50000"/>
@@ -3891,13 +3874,6 @@
   <p:clrMapOvr>
     <a:masterClrMapping/>
   </p:clrMapOvr>
-  <p:timing>
-    <p:tnLst>
-      <p:par>
-        <p:cTn id="1" dur="indefinite" restart="never" nodeType="tmRoot"/>
-      </p:par>
-    </p:tnLst>
-  </p:timing>
 </p:sld>
 </file>
 
@@ -4082,20 +4058,10 @@
                   </a:schemeClr>
                 </a:solidFill>
               </a:rPr>
-              <a:t>Dicionário de </a:t>
-            </a:r>
-            <a:r>
-              <a:rPr lang="en-US" sz="2400" dirty="0" smtClean="0">
-                <a:solidFill>
-                  <a:schemeClr val="accent1">
-                    <a:lumMod val="50000"/>
-                  </a:schemeClr>
-                </a:solidFill>
-              </a:rPr>
-              <a:t>Dados - </a:t>
-            </a:r>
-            <a:r>
-              <a:rPr lang="en-US" sz="2400" dirty="0" err="1" smtClean="0">
+              <a:t>Dicionário de Dados - </a:t>
+            </a:r>
+            <a:r>
+              <a:rPr lang="en-US" sz="2400" dirty="0" err="1">
                 <a:solidFill>
                   <a:schemeClr val="accent1">
                     <a:lumMod val="50000"/>
@@ -4202,13 +4168,6 @@
   <p:clrMapOvr>
     <a:masterClrMapping/>
   </p:clrMapOvr>
-  <p:timing>
-    <p:tnLst>
-      <p:par>
-        <p:cTn id="1" dur="indefinite" restart="never" nodeType="tmRoot"/>
-      </p:par>
-    </p:tnLst>
-  </p:timing>
 </p:sld>
 </file>
 
@@ -4393,20 +4352,10 @@
                   </a:schemeClr>
                 </a:solidFill>
               </a:rPr>
-              <a:t>Dicionário de </a:t>
-            </a:r>
-            <a:r>
-              <a:rPr lang="en-US" sz="2400" dirty="0" smtClean="0">
-                <a:solidFill>
-                  <a:schemeClr val="accent1">
-                    <a:lumMod val="50000"/>
-                  </a:schemeClr>
-                </a:solidFill>
-              </a:rPr>
-              <a:t>Dados - </a:t>
-            </a:r>
-            <a:r>
-              <a:rPr lang="en-US" sz="2400" dirty="0" err="1" smtClean="0">
+              <a:t>Dicionário de Dados - </a:t>
+            </a:r>
+            <a:r>
+              <a:rPr lang="en-US" sz="2400" dirty="0" err="1">
                 <a:solidFill>
                   <a:schemeClr val="accent1">
                     <a:lumMod val="50000"/>
@@ -4513,13 +4462,6 @@
   <p:clrMapOvr>
     <a:masterClrMapping/>
   </p:clrMapOvr>
-  <p:timing>
-    <p:tnLst>
-      <p:par>
-        <p:cTn id="1" dur="indefinite" restart="never" nodeType="tmRoot"/>
-      </p:par>
-    </p:tnLst>
-  </p:timing>
 </p:sld>
 </file>
 
@@ -4697,7 +4639,7 @@
           <a:p>
             <a:pPr algn="ctr"/>
             <a:r>
-              <a:rPr lang="en-US" sz="2400" dirty="0" err="1" smtClean="0">
+              <a:rPr lang="en-US" sz="2400" dirty="0" err="1">
                 <a:solidFill>
                   <a:schemeClr val="accent1">
                     <a:lumMod val="50000"/>
@@ -4707,7 +4649,7 @@
               <a:t>Diagrama</a:t>
             </a:r>
             <a:r>
-              <a:rPr lang="en-US" sz="2400" dirty="0" smtClean="0">
+              <a:rPr lang="en-US" sz="2400" dirty="0">
                 <a:solidFill>
                   <a:schemeClr val="accent1">
                     <a:lumMod val="50000"/>
@@ -4814,13 +4756,6 @@
   <p:clrMapOvr>
     <a:masterClrMapping/>
   </p:clrMapOvr>
-  <p:timing>
-    <p:tnLst>
-      <p:par>
-        <p:cTn id="1" dur="indefinite" restart="never" nodeType="tmRoot"/>
-      </p:par>
-    </p:tnLst>
-  </p:timing>
 </p:sld>
 </file>
 
@@ -4998,7 +4933,7 @@
           <a:p>
             <a:pPr algn="ctr"/>
             <a:r>
-              <a:rPr lang="en-US" sz="2400" dirty="0" err="1" smtClean="0">
+              <a:rPr lang="en-US" sz="2400" dirty="0" err="1">
                 <a:solidFill>
                   <a:schemeClr val="accent1">
                     <a:lumMod val="50000"/>
@@ -5008,7 +4943,7 @@
               <a:t>Diagrama</a:t>
             </a:r>
             <a:r>
-              <a:rPr lang="en-US" sz="2400" dirty="0" smtClean="0">
+              <a:rPr lang="en-US" sz="2400" dirty="0">
                 <a:solidFill>
                   <a:schemeClr val="accent1">
                     <a:lumMod val="50000"/>
@@ -5115,13 +5050,6 @@
   <p:clrMapOvr>
     <a:masterClrMapping/>
   </p:clrMapOvr>
-  <p:timing>
-    <p:tnLst>
-      <p:par>
-        <p:cTn id="1" dur="indefinite" restart="never" nodeType="tmRoot"/>
-      </p:par>
-    </p:tnLst>
-  </p:timing>
 </p:sld>
 </file>
 
@@ -5299,7 +5227,7 @@
           <a:p>
             <a:pPr algn="ctr"/>
             <a:r>
-              <a:rPr lang="en-US" sz="2400" dirty="0" err="1" smtClean="0">
+              <a:rPr lang="en-US" sz="2400" dirty="0" err="1">
                 <a:solidFill>
                   <a:schemeClr val="accent1">
                     <a:lumMod val="50000"/>
@@ -5309,7 +5237,7 @@
               <a:t>Diagrama</a:t>
             </a:r>
             <a:r>
-              <a:rPr lang="en-US" sz="2400" dirty="0" smtClean="0">
+              <a:rPr lang="en-US" sz="2400" dirty="0">
                 <a:solidFill>
                   <a:schemeClr val="accent1">
                     <a:lumMod val="50000"/>
@@ -5416,13 +5344,6 @@
   <p:clrMapOvr>
     <a:masterClrMapping/>
   </p:clrMapOvr>
-  <p:timing>
-    <p:tnLst>
-      <p:par>
-        <p:cTn id="1" dur="indefinite" restart="never" nodeType="tmRoot"/>
-      </p:par>
-    </p:tnLst>
-  </p:timing>
 </p:sld>
 </file>
 
@@ -5747,25 +5668,8 @@
                   </a:schemeClr>
                 </a:solidFill>
               </a:rPr>
-              <a:t>” no mercado 2,5</a:t>
-            </a:r>
-            <a:r>
-              <a:rPr lang="pt-PT" dirty="0" smtClean="0">
-                <a:solidFill>
-                  <a:schemeClr val="accent1">
-                    <a:lumMod val="50000"/>
-                  </a:schemeClr>
-                </a:solidFill>
-              </a:rPr>
-              <a:t>.</a:t>
-            </a:r>
-            <a:endParaRPr lang="pt-PT" dirty="0">
-              <a:solidFill>
-                <a:schemeClr val="accent1">
-                  <a:lumMod val="50000"/>
-                </a:schemeClr>
-              </a:solidFill>
-            </a:endParaRPr>
+              <a:t>” no mercado 2,5.</a:t>
+            </a:r>
           </a:p>
         </p:txBody>
       </p:sp>
@@ -5812,7 +5716,7 @@
           <a:p>
             <a:pPr algn="ctr"/>
             <a:r>
-              <a:rPr lang="pt-PT" sz="2400" dirty="0" smtClean="0">
+              <a:rPr lang="pt-PT" sz="2400" dirty="0">
                 <a:solidFill>
                   <a:schemeClr val="accent1">
                     <a:lumMod val="50000"/>
@@ -5891,7 +5795,7 @@
               </a:rPr>
               <a:t>)</a:t>
             </a:r>
-            <a:endParaRPr lang="pt-PT" sz="2400" dirty="0" smtClean="0">
+            <a:endParaRPr lang="pt-PT" sz="2400" dirty="0">
               <a:solidFill>
                 <a:schemeClr val="accent1">
                   <a:lumMod val="50000"/>
@@ -5959,13 +5863,6 @@
   <p:clrMapOvr>
     <a:masterClrMapping/>
   </p:clrMapOvr>
-  <p:timing>
-    <p:tnLst>
-      <p:par>
-        <p:cTn id="1" dur="indefinite" restart="never" nodeType="tmRoot"/>
-      </p:par>
-    </p:tnLst>
-  </p:timing>
 </p:sld>
 </file>
 
@@ -6136,32 +6033,12 @@
                   </a:schemeClr>
                 </a:solidFill>
               </a:rPr>
-              <a:t>Cenário </a:t>
-            </a:r>
-            <a:r>
-              <a:rPr lang="pt-PT" sz="2400" b="1" dirty="0" smtClean="0">
-                <a:solidFill>
-                  <a:schemeClr val="accent1">
-                    <a:lumMod val="50000"/>
-                  </a:schemeClr>
-                </a:solidFill>
-              </a:rPr>
-              <a:t>Secundário:</a:t>
+              <a:t>Cenário Secundário:</a:t>
             </a:r>
           </a:p>
           <a:p>
             <a:pPr lvl="1"/>
             <a:r>
-              <a:rPr lang="pt-PT" dirty="0" smtClean="0">
-                <a:solidFill>
-                  <a:schemeClr val="accent1">
-                    <a:lumMod val="50000"/>
-                  </a:schemeClr>
-                </a:solidFill>
-              </a:rPr>
-              <a:t>1.1. O </a:t>
-            </a:r>
-            <a:r>
               <a:rPr lang="pt-PT" dirty="0">
                 <a:solidFill>
                   <a:schemeClr val="accent1">
@@ -6169,32 +6046,12 @@
                   </a:schemeClr>
                 </a:solidFill>
               </a:rPr>
-              <a:t>utilizador pode selecionar várias ligas ao mesmo </a:t>
-            </a:r>
-            <a:r>
-              <a:rPr lang="pt-PT" dirty="0" smtClean="0">
-                <a:solidFill>
-                  <a:schemeClr val="accent1">
-                    <a:lumMod val="50000"/>
-                  </a:schemeClr>
-                </a:solidFill>
-              </a:rPr>
-              <a:t>tempo.</a:t>
+              <a:t>1.1. O utilizador pode selecionar várias ligas ao mesmo tempo.</a:t>
             </a:r>
           </a:p>
           <a:p>
             <a:pPr lvl="1"/>
             <a:r>
-              <a:rPr lang="pt-PT" dirty="0" smtClean="0">
-                <a:solidFill>
-                  <a:schemeClr val="accent1">
-                    <a:lumMod val="50000"/>
-                  </a:schemeClr>
-                </a:solidFill>
-              </a:rPr>
-              <a:t>2.1. No </a:t>
-            </a:r>
-            <a:r>
               <a:rPr lang="pt-PT" dirty="0">
                 <a:solidFill>
                   <a:schemeClr val="accent1">
@@ -6202,32 +6059,12 @@
                   </a:schemeClr>
                 </a:solidFill>
               </a:rPr>
-              <a:t>caso de o utilizador ter selecionado várias ligas os botões das mesmas permanecerão </a:t>
-            </a:r>
-            <a:r>
-              <a:rPr lang="pt-PT" dirty="0" smtClean="0">
-                <a:solidFill>
-                  <a:schemeClr val="accent1">
-                    <a:lumMod val="50000"/>
-                  </a:schemeClr>
-                </a:solidFill>
-              </a:rPr>
-              <a:t>destacados.</a:t>
+              <a:t>2.1. No caso de o utilizador ter selecionado várias ligas os botões das mesmas permanecerão destacados.</a:t>
             </a:r>
           </a:p>
           <a:p>
             <a:pPr lvl="1"/>
             <a:r>
-              <a:rPr lang="pt-PT" dirty="0" smtClean="0">
-                <a:solidFill>
-                  <a:schemeClr val="accent1">
-                    <a:lumMod val="50000"/>
-                  </a:schemeClr>
-                </a:solidFill>
-              </a:rPr>
-              <a:t>3.1. Se </a:t>
-            </a:r>
-            <a:r>
               <a:rPr lang="pt-PT" dirty="0">
                 <a:solidFill>
                   <a:schemeClr val="accent1">
@@ -6235,25 +6072,8 @@
                   </a:schemeClr>
                 </a:solidFill>
               </a:rPr>
-              <a:t>não houver encontros a aplicação mostra uma mensagem de erro e volta ao ponto 1</a:t>
-            </a:r>
-            <a:r>
-              <a:rPr lang="pt-PT" dirty="0" smtClean="0">
-                <a:solidFill>
-                  <a:schemeClr val="accent1">
-                    <a:lumMod val="50000"/>
-                  </a:schemeClr>
-                </a:solidFill>
-              </a:rPr>
-              <a:t>.</a:t>
-            </a:r>
-            <a:endParaRPr lang="pt-PT" dirty="0">
-              <a:solidFill>
-                <a:schemeClr val="accent1">
-                  <a:lumMod val="50000"/>
-                </a:schemeClr>
-              </a:solidFill>
-            </a:endParaRPr>
+              <a:t>3.1. Se não houver encontros a aplicação mostra uma mensagem de erro e volta ao ponto 1.</a:t>
+            </a:r>
           </a:p>
         </p:txBody>
       </p:sp>
@@ -6300,7 +6120,7 @@
           <a:p>
             <a:pPr algn="ctr"/>
             <a:r>
-              <a:rPr lang="pt-PT" sz="2400" dirty="0" smtClean="0">
+              <a:rPr lang="pt-PT" sz="2400" dirty="0">
                 <a:solidFill>
                   <a:schemeClr val="accent1">
                     <a:lumMod val="50000"/>
@@ -6379,7 +6199,7 @@
               </a:rPr>
               <a:t>)</a:t>
             </a:r>
-            <a:endParaRPr lang="pt-PT" sz="2400" dirty="0" smtClean="0">
+            <a:endParaRPr lang="pt-PT" sz="2400" dirty="0">
               <a:solidFill>
                 <a:schemeClr val="accent1">
                   <a:lumMod val="50000"/>
@@ -6447,13 +6267,6 @@
   <p:clrMapOvr>
     <a:masterClrMapping/>
   </p:clrMapOvr>
-  <p:timing>
-    <p:tnLst>
-      <p:par>
-        <p:cTn id="1" dur="indefinite" restart="never" nodeType="tmRoot"/>
-      </p:par>
-    </p:tnLst>
-  </p:timing>
 </p:sld>
 </file>
 
@@ -6764,13 +6577,6 @@
   <p:clrMapOvr>
     <a:masterClrMapping/>
   </p:clrMapOvr>
-  <p:timing>
-    <p:tnLst>
-      <p:par>
-        <p:cTn id="1" dur="indefinite" restart="never" nodeType="tmRoot"/>
-      </p:par>
-    </p:tnLst>
-  </p:timing>
 </p:sld>
 </file>
 
@@ -6948,7 +6754,7 @@
           <a:p>
             <a:pPr algn="ctr"/>
             <a:r>
-              <a:rPr lang="en-US" sz="2400" dirty="0" err="1" smtClean="0">
+              <a:rPr lang="en-US" sz="2400" dirty="0" err="1">
                 <a:solidFill>
                   <a:schemeClr val="accent1">
                     <a:lumMod val="50000"/>
@@ -6958,7 +6764,7 @@
               <a:t>Processo</a:t>
             </a:r>
             <a:r>
-              <a:rPr lang="en-US" sz="2400" dirty="0" smtClean="0">
+              <a:rPr lang="en-US" sz="2400" dirty="0">
                 <a:solidFill>
                   <a:schemeClr val="accent1">
                     <a:lumMod val="50000"/>
@@ -6968,7 +6774,7 @@
               <a:t> (</a:t>
             </a:r>
             <a:r>
-              <a:rPr lang="en-US" sz="2000" dirty="0" err="1" smtClean="0">
+              <a:rPr lang="en-US" sz="2000" dirty="0" err="1">
                 <a:solidFill>
                   <a:schemeClr val="accent1">
                     <a:lumMod val="50000"/>
@@ -6978,16 +6784,6 @@
               <a:t>Listar</a:t>
             </a:r>
             <a:r>
-              <a:rPr lang="en-US" sz="2000" dirty="0" smtClean="0">
-                <a:solidFill>
-                  <a:schemeClr val="accent1">
-                    <a:lumMod val="50000"/>
-                  </a:schemeClr>
-                </a:solidFill>
-              </a:rPr>
-              <a:t> </a:t>
-            </a:r>
-            <a:r>
               <a:rPr lang="en-US" sz="2000" dirty="0">
                 <a:solidFill>
                   <a:schemeClr val="accent1">
@@ -6995,7 +6791,7 @@
                   </a:schemeClr>
                 </a:solidFill>
               </a:rPr>
-              <a:t>Próximos Jogos</a:t>
+              <a:t> Próximos Jogos</a:t>
             </a:r>
             <a:r>
               <a:rPr lang="en-US" sz="2400" dirty="0">
@@ -7105,13 +6901,6 @@
   <p:clrMapOvr>
     <a:masterClrMapping/>
   </p:clrMapOvr>
-  <p:timing>
-    <p:tnLst>
-      <p:par>
-        <p:cTn id="1" dur="indefinite" restart="never" nodeType="tmRoot"/>
-      </p:par>
-    </p:tnLst>
-  </p:timing>
 </p:sld>
 </file>
 
@@ -7506,13 +7295,6 @@
   <p:clrMapOvr>
     <a:masterClrMapping/>
   </p:clrMapOvr>
-  <p:timing>
-    <p:tnLst>
-      <p:par>
-        <p:cTn id="1" dur="indefinite" restart="never" nodeType="tmRoot"/>
-      </p:par>
-    </p:tnLst>
-  </p:timing>
 </p:sld>
 </file>
 
@@ -7683,32 +7465,12 @@
                   </a:schemeClr>
                 </a:solidFill>
               </a:rPr>
-              <a:t>Pré-Condição</a:t>
-            </a:r>
-            <a:r>
-              <a:rPr lang="pt-PT" sz="2400" b="1" dirty="0" smtClean="0">
-                <a:solidFill>
-                  <a:schemeClr val="accent1">
-                    <a:lumMod val="50000"/>
-                  </a:schemeClr>
-                </a:solidFill>
-              </a:rPr>
-              <a:t>:</a:t>
+              <a:t>Pré-Condição:</a:t>
             </a:r>
           </a:p>
           <a:p>
             <a:pPr lvl="0"/>
             <a:r>
-              <a:rPr lang="pt-PT" dirty="0" smtClean="0">
-                <a:solidFill>
-                  <a:schemeClr val="accent1">
-                    <a:lumMod val="50000"/>
-                  </a:schemeClr>
-                </a:solidFill>
-              </a:rPr>
-              <a:t>	O </a:t>
-            </a:r>
-            <a:r>
               <a:rPr lang="pt-PT" dirty="0">
                 <a:solidFill>
                   <a:schemeClr val="accent1">
@@ -7716,17 +7478,7 @@
                   </a:schemeClr>
                 </a:solidFill>
               </a:rPr>
-              <a:t>utilizador tem de estar autenticado</a:t>
-            </a:r>
-            <a:r>
-              <a:rPr lang="pt-PT" dirty="0" smtClean="0">
-                <a:solidFill>
-                  <a:schemeClr val="accent1">
-                    <a:lumMod val="50000"/>
-                  </a:schemeClr>
-                </a:solidFill>
-              </a:rPr>
-              <a:t>.</a:t>
+              <a:t>	O utilizador tem de estar autenticado.</a:t>
             </a:r>
             <a:endParaRPr lang="pt-PT" sz="2400" b="1" dirty="0">
               <a:solidFill>
@@ -7738,7 +7490,7 @@
           </a:p>
           <a:p>
             <a:r>
-              <a:rPr lang="pt-PT" sz="2400" b="1" dirty="0" smtClean="0">
+              <a:rPr lang="pt-PT" sz="2400" b="1" dirty="0">
                 <a:solidFill>
                   <a:schemeClr val="accent1">
                     <a:lumMod val="50000"/>
@@ -7825,17 +7577,7 @@
                   </a:schemeClr>
                 </a:solidFill>
               </a:rPr>
-              <a:t>Uma mensagem de sucesso é mostrada</a:t>
-            </a:r>
-            <a:r>
-              <a:rPr lang="pt-PT" dirty="0" smtClean="0">
-                <a:solidFill>
-                  <a:schemeClr val="accent1">
-                    <a:lumMod val="50000"/>
-                  </a:schemeClr>
-                </a:solidFill>
-              </a:rPr>
-              <a:t>.</a:t>
+              <a:t>Uma mensagem de sucesso é mostrada.</a:t>
             </a:r>
             <a:endParaRPr lang="pt-PT" sz="2400" b="1" dirty="0">
               <a:solidFill>
@@ -7847,7 +7589,7 @@
           </a:p>
           <a:p>
             <a:r>
-              <a:rPr lang="pt-PT" sz="2400" b="1" dirty="0" smtClean="0">
+              <a:rPr lang="pt-PT" sz="2400" b="1" dirty="0">
                 <a:solidFill>
                   <a:schemeClr val="accent1">
                     <a:lumMod val="50000"/>
@@ -7860,16 +7602,6 @@
           <a:p>
             <a:pPr lvl="0"/>
             <a:r>
-              <a:rPr lang="pt-PT" dirty="0" smtClean="0">
-                <a:solidFill>
-                  <a:schemeClr val="accent1">
-                    <a:lumMod val="50000"/>
-                  </a:schemeClr>
-                </a:solidFill>
-              </a:rPr>
-              <a:t>	Em </a:t>
-            </a:r>
-            <a:r>
               <a:rPr lang="pt-PT" dirty="0">
                 <a:solidFill>
                   <a:schemeClr val="accent1">
@@ -7877,25 +7609,8 @@
                   </a:schemeClr>
                 </a:solidFill>
               </a:rPr>
-              <a:t>períodos regulares, o Utilizador receberá um e-mail com a Newsletter</a:t>
-            </a:r>
-            <a:r>
-              <a:rPr lang="pt-PT" dirty="0" smtClean="0">
-                <a:solidFill>
-                  <a:schemeClr val="accent1">
-                    <a:lumMod val="50000"/>
-                  </a:schemeClr>
-                </a:solidFill>
-              </a:rPr>
-              <a:t>.</a:t>
-            </a:r>
-            <a:endParaRPr lang="pt-PT" dirty="0">
-              <a:solidFill>
-                <a:schemeClr val="accent1">
-                  <a:lumMod val="50000"/>
-                </a:schemeClr>
-              </a:solidFill>
-            </a:endParaRPr>
+              <a:t>	Em períodos regulares, o Utilizador receberá um e-mail com a Newsletter.</a:t>
+            </a:r>
           </a:p>
         </p:txBody>
       </p:sp>
@@ -7942,7 +7657,7 @@
           <a:p>
             <a:pPr algn="ctr"/>
             <a:r>
-              <a:rPr lang="pt-PT" sz="2400" dirty="0" smtClean="0">
+              <a:rPr lang="pt-PT" sz="2400" dirty="0">
                 <a:solidFill>
                   <a:schemeClr val="accent1">
                     <a:lumMod val="50000"/>
@@ -7952,7 +7667,7 @@
               <a:t>Descrição estruturada </a:t>
             </a:r>
             <a:r>
-              <a:rPr lang="en-US" sz="2800" dirty="0" smtClean="0">
+              <a:rPr lang="en-US" sz="2800" dirty="0">
                 <a:solidFill>
                   <a:schemeClr val="accent1">
                     <a:lumMod val="50000"/>
@@ -7962,7 +7677,7 @@
               <a:t>(</a:t>
             </a:r>
             <a:r>
-              <a:rPr lang="en-US" sz="2400" dirty="0" err="1" smtClean="0">
+              <a:rPr lang="en-US" sz="2400" dirty="0" err="1">
                 <a:solidFill>
                   <a:schemeClr val="accent1">
                     <a:lumMod val="50000"/>
@@ -7972,7 +7687,7 @@
               <a:t>Subscrever</a:t>
             </a:r>
             <a:r>
-              <a:rPr lang="en-US" sz="2400" dirty="0" smtClean="0">
+              <a:rPr lang="en-US" sz="2400" dirty="0">
                 <a:solidFill>
                   <a:schemeClr val="accent1">
                     <a:lumMod val="50000"/>
@@ -7982,7 +7697,7 @@
               <a:t> Newsletter</a:t>
             </a:r>
             <a:r>
-              <a:rPr lang="en-US" sz="2800" dirty="0" smtClean="0">
+              <a:rPr lang="en-US" sz="2800" dirty="0">
                 <a:solidFill>
                   <a:schemeClr val="accent1">
                     <a:lumMod val="50000"/>
@@ -7991,7 +7706,7 @@
               </a:rPr>
               <a:t>)</a:t>
             </a:r>
-            <a:endParaRPr lang="pt-PT" sz="2400" dirty="0" smtClean="0">
+            <a:endParaRPr lang="pt-PT" sz="2400" dirty="0">
               <a:solidFill>
                 <a:schemeClr val="accent1">
                   <a:lumMod val="50000"/>
@@ -8059,13 +7774,6 @@
   <p:clrMapOvr>
     <a:masterClrMapping/>
   </p:clrMapOvr>
-  <p:timing>
-    <p:tnLst>
-      <p:par>
-        <p:cTn id="1" dur="indefinite" restart="never" nodeType="tmRoot"/>
-      </p:par>
-    </p:tnLst>
-  </p:timing>
 </p:sld>
 </file>
 
@@ -8236,30 +7944,10 @@
                   </a:schemeClr>
                 </a:solidFill>
               </a:rPr>
-              <a:t>Cenário </a:t>
-            </a:r>
-            <a:r>
-              <a:rPr lang="pt-PT" sz="2400" b="1" dirty="0" smtClean="0">
-                <a:solidFill>
-                  <a:schemeClr val="accent1">
-                    <a:lumMod val="50000"/>
-                  </a:schemeClr>
-                </a:solidFill>
-              </a:rPr>
-              <a:t>Secundário:</a:t>
-            </a:r>
-          </a:p>
-          <a:p>
-            <a:r>
-              <a:rPr lang="pt-PT" dirty="0" smtClean="0">
-                <a:solidFill>
-                  <a:schemeClr val="accent1">
-                    <a:lumMod val="50000"/>
-                  </a:schemeClr>
-                </a:solidFill>
-              </a:rPr>
-              <a:t>	3.1</a:t>
-            </a:r>
+              <a:t>Cenário Secundário:</a:t>
+            </a:r>
+          </a:p>
+          <a:p>
             <a:r>
               <a:rPr lang="pt-PT" dirty="0">
                 <a:solidFill>
@@ -8268,25 +7956,8 @@
                   </a:schemeClr>
                 </a:solidFill>
               </a:rPr>
-              <a:t>. Se algo inesperado acontecer, uma mensagem de erro será mostrada ao utilizador e volta para o ponto </a:t>
-            </a:r>
-            <a:r>
-              <a:rPr lang="pt-PT" dirty="0" smtClean="0">
-                <a:solidFill>
-                  <a:schemeClr val="accent1">
-                    <a:lumMod val="50000"/>
-                  </a:schemeClr>
-                </a:solidFill>
-              </a:rPr>
-              <a:t>2.</a:t>
-            </a:r>
-            <a:endParaRPr lang="pt-PT" dirty="0">
-              <a:solidFill>
-                <a:schemeClr val="accent1">
-                  <a:lumMod val="50000"/>
-                </a:schemeClr>
-              </a:solidFill>
-            </a:endParaRPr>
+              <a:t>	3.1. Se algo inesperado acontecer, uma mensagem de erro será mostrada ao utilizador e volta para o ponto 2.</a:t>
+            </a:r>
           </a:p>
         </p:txBody>
       </p:sp>
@@ -8333,7 +8004,7 @@
           <a:p>
             <a:pPr algn="ctr"/>
             <a:r>
-              <a:rPr lang="pt-PT" sz="2400" dirty="0" smtClean="0">
+              <a:rPr lang="pt-PT" sz="2400" dirty="0">
                 <a:solidFill>
                   <a:schemeClr val="accent1">
                     <a:lumMod val="50000"/>
@@ -8373,7 +8044,7 @@
               <a:t> Newsletter</a:t>
             </a:r>
             <a:r>
-              <a:rPr lang="en-US" sz="2800" dirty="0" smtClean="0">
+              <a:rPr lang="en-US" sz="2800" dirty="0">
                 <a:solidFill>
                   <a:schemeClr val="accent1">
                     <a:lumMod val="50000"/>
@@ -8450,13 +8121,6 @@
   <p:clrMapOvr>
     <a:masterClrMapping/>
   </p:clrMapOvr>
-  <p:timing>
-    <p:tnLst>
-      <p:par>
-        <p:cTn id="1" dur="indefinite" restart="never" nodeType="tmRoot"/>
-      </p:par>
-    </p:tnLst>
-  </p:timing>
 </p:sld>
 </file>
 
@@ -8767,13 +8431,6 @@
   <p:clrMapOvr>
     <a:masterClrMapping/>
   </p:clrMapOvr>
-  <p:timing>
-    <p:tnLst>
-      <p:par>
-        <p:cTn id="1" dur="indefinite" restart="never" nodeType="tmRoot"/>
-      </p:par>
-    </p:tnLst>
-  </p:timing>
 </p:sld>
 </file>
 
@@ -8951,7 +8608,7 @@
           <a:p>
             <a:pPr algn="ctr"/>
             <a:r>
-              <a:rPr lang="en-US" sz="2400" dirty="0" err="1" smtClean="0">
+              <a:rPr lang="en-US" sz="2400" dirty="0" err="1">
                 <a:solidFill>
                   <a:schemeClr val="accent1">
                     <a:lumMod val="50000"/>
@@ -8961,7 +8618,7 @@
               <a:t>Processo</a:t>
             </a:r>
             <a:r>
-              <a:rPr lang="en-US" sz="2400" dirty="0" smtClean="0">
+              <a:rPr lang="en-US" sz="2400" dirty="0">
                 <a:solidFill>
                   <a:schemeClr val="accent1">
                     <a:lumMod val="50000"/>
@@ -9108,13 +8765,6 @@
   <p:clrMapOvr>
     <a:masterClrMapping/>
   </p:clrMapOvr>
-  <p:timing>
-    <p:tnLst>
-      <p:par>
-        <p:cTn id="1" dur="indefinite" restart="never" nodeType="tmRoot"/>
-      </p:par>
-    </p:tnLst>
-  </p:timing>
 </p:sld>
 </file>
 
@@ -9405,13 +9055,6 @@
   <p:clrMapOvr>
     <a:masterClrMapping/>
   </p:clrMapOvr>
-  <p:timing>
-    <p:tnLst>
-      <p:par>
-        <p:cTn id="1" dur="indefinite" restart="never" nodeType="tmRoot"/>
-      </p:par>
-    </p:tnLst>
-  </p:timing>
 </p:sld>
 </file>
 
@@ -9560,8 +9203,8 @@
         </p:nvSpPr>
         <p:spPr>
           <a:xfrm>
-            <a:off x="1038687" y="2020540"/>
-            <a:ext cx="10289220" cy="3416320"/>
+            <a:off x="1029809" y="1612167"/>
+            <a:ext cx="10289220" cy="4524315"/>
           </a:xfrm>
           <a:prstGeom prst="rect">
             <a:avLst/>
@@ -9576,7 +9219,7 @@
           <a:p>
             <a:pPr algn="just"/>
             <a:r>
-              <a:rPr lang="pt-PT" dirty="0" smtClean="0">
+              <a:rPr lang="pt-PT" dirty="0">
                 <a:solidFill>
                   <a:schemeClr val="accent1">
                     <a:lumMod val="50000"/>
@@ -9589,7 +9232,7 @@
           <a:p>
             <a:pPr algn="just"/>
             <a:r>
-              <a:rPr lang="pt-PT" dirty="0" smtClean="0">
+              <a:rPr lang="pt-PT" dirty="0">
                 <a:solidFill>
                   <a:schemeClr val="accent1">
                     <a:lumMod val="50000"/>
@@ -9602,7 +9245,7 @@
           <a:p>
             <a:pPr algn="just"/>
             <a:r>
-              <a:rPr lang="pt-PT" dirty="0" smtClean="0">
+              <a:rPr lang="pt-PT" dirty="0">
                 <a:solidFill>
                   <a:schemeClr val="accent1">
                     <a:lumMod val="50000"/>
@@ -9615,7 +9258,7 @@
           <a:p>
             <a:pPr algn="just"/>
             <a:r>
-              <a:rPr lang="pt-PT" dirty="0" smtClean="0">
+              <a:rPr lang="pt-PT" dirty="0">
                 <a:solidFill>
                   <a:schemeClr val="accent1">
                     <a:lumMod val="50000"/>
@@ -9628,40 +9271,82 @@
           <a:p>
             <a:pPr algn="just"/>
             <a:r>
-              <a:rPr lang="pt-PT" dirty="0" smtClean="0">
-                <a:solidFill>
-                  <a:schemeClr val="accent1">
-                    <a:lumMod val="50000"/>
-                  </a:schemeClr>
-                </a:solidFill>
-              </a:rPr>
-              <a:t>Um utilizador não autenticado (sem sessão iniciada) pode ver a listagem de encontros de futebol e pode também fazer filtragem por competição e/ou equipa, mas não tem acesso aos prognósticos disponíveis no serviço. </a:t>
-            </a:r>
-            <a:endParaRPr lang="pt-PT" dirty="0">
-              <a:solidFill>
-                <a:schemeClr val="accent1">
-                  <a:lumMod val="50000"/>
-                </a:schemeClr>
-              </a:solidFill>
-            </a:endParaRPr>
+              <a:rPr lang="pt-PT" dirty="0">
+                <a:solidFill>
+                  <a:schemeClr val="accent1">
+                    <a:lumMod val="50000"/>
+                  </a:schemeClr>
+                </a:solidFill>
+              </a:rPr>
+              <a:t>Um utilizador não autenticado (sem sessão iniciada) pode ver a listagem de encontros de futebol e também fazer filtragem por competição e/ou equipa.</a:t>
+            </a:r>
           </a:p>
           <a:p>
             <a:pPr algn="just"/>
             <a:r>
-              <a:rPr lang="pt-PT" dirty="0" smtClean="0">
-                <a:solidFill>
-                  <a:schemeClr val="accent1">
-                    <a:lumMod val="50000"/>
-                  </a:schemeClr>
-                </a:solidFill>
-              </a:rPr>
-              <a:t>Um utilizador autenticado (com sessão iniciada) tem acesso a todas a funcionalidades anteriormente mencionadas, e também à subscrição/anulação de Newsletter dependendo do estado da mesma (ativa/inativa).</a:t>
+              <a:rPr lang="en-US" dirty="0">
+                <a:solidFill>
+                  <a:schemeClr val="accent1">
+                    <a:lumMod val="50000"/>
+                  </a:schemeClr>
+                </a:solidFill>
+              </a:rPr>
+              <a:t>U</a:t>
+            </a:r>
+            <a:r>
+              <a:rPr lang="pt-PT" dirty="0">
+                <a:solidFill>
+                  <a:schemeClr val="accent1">
+                    <a:lumMod val="50000"/>
+                  </a:schemeClr>
+                </a:solidFill>
+              </a:rPr>
+              <a:t>m utilizador não autenticado tem apenas acesso aos prognósticos para os jogos correntes, mas não tem acesso ao histórico completo.</a:t>
             </a:r>
           </a:p>
           <a:p>
             <a:pPr algn="just"/>
             <a:r>
-              <a:rPr lang="pt-PT" dirty="0" smtClean="0">
+              <a:rPr lang="pt-PT" dirty="0">
+                <a:solidFill>
+                  <a:schemeClr val="accent1">
+                    <a:lumMod val="50000"/>
+                  </a:schemeClr>
+                </a:solidFill>
+              </a:rPr>
+              <a:t>Um utilizador autenticado (com sessão iniciada) tem acesso a todas as funcionalidades anteriormente mencionadas. </a:t>
+            </a:r>
+          </a:p>
+          <a:p>
+            <a:pPr algn="just"/>
+            <a:r>
+              <a:rPr lang="pt-PT" dirty="0">
+                <a:solidFill>
+                  <a:schemeClr val="accent1">
+                    <a:lumMod val="50000"/>
+                  </a:schemeClr>
+                </a:solidFill>
+              </a:rPr>
+              <a:t>Um utilizador autenticado tem também acesso à subscrição/anulação do serviço de Newsletter, dependendo do estado da mesma (ativa/inativa)</a:t>
+            </a:r>
+          </a:p>
+          <a:p>
+            <a:pPr algn="just"/>
+            <a:r>
+              <a:rPr lang="pt-PT" dirty="0">
+                <a:solidFill>
+                  <a:schemeClr val="accent1">
+                    <a:lumMod val="50000"/>
+                  </a:schemeClr>
+                </a:solidFill>
+              </a:rPr>
+              <a:t>Um utilizador autenticado pode ainda ver os históricos de todos os prognósticos gerados pelo sistema até ao momento.</a:t>
+            </a:r>
+          </a:p>
+          <a:p>
+            <a:pPr algn="just"/>
+            <a:r>
+              <a:rPr lang="pt-PT" dirty="0">
                 <a:solidFill>
                   <a:schemeClr val="accent1">
                     <a:lumMod val="50000"/>
@@ -9716,7 +9401,7 @@
           <a:p>
             <a:pPr algn="ctr"/>
             <a:r>
-              <a:rPr lang="pt-PT" sz="2400" dirty="0" smtClean="0">
+              <a:rPr lang="pt-PT" sz="2400" dirty="0">
                 <a:solidFill>
                   <a:schemeClr val="accent1">
                     <a:lumMod val="50000"/>
@@ -9725,13 +9410,6 @@
               </a:rPr>
               <a:t>Requisitos Funcionais - Utilizador</a:t>
             </a:r>
-            <a:endParaRPr lang="pt-PT" sz="2400" dirty="0">
-              <a:solidFill>
-                <a:schemeClr val="accent1">
-                  <a:lumMod val="50000"/>
-                </a:schemeClr>
-              </a:solidFill>
-            </a:endParaRPr>
           </a:p>
         </p:txBody>
       </p:sp>
@@ -9793,13 +9471,6 @@
   <p:clrMapOvr>
     <a:masterClrMapping/>
   </p:clrMapOvr>
-  <p:timing>
-    <p:tnLst>
-      <p:par>
-        <p:cTn id="1" dur="indefinite" restart="never" nodeType="tmRoot"/>
-      </p:par>
-    </p:tnLst>
-  </p:timing>
 </p:sld>
 </file>
 
@@ -9964,7 +9635,7 @@
           <a:p>
             <a:pPr algn="just"/>
             <a:r>
-              <a:rPr lang="pt-PT" dirty="0" smtClean="0">
+              <a:rPr lang="pt-PT" dirty="0">
                 <a:solidFill>
                   <a:schemeClr val="accent1">
                     <a:lumMod val="50000"/>
@@ -9977,7 +9648,7 @@
           <a:p>
             <a:pPr algn="just"/>
             <a:r>
-              <a:rPr lang="pt-PT" dirty="0" smtClean="0">
+              <a:rPr lang="pt-PT" dirty="0">
                 <a:solidFill>
                   <a:schemeClr val="accent1">
                     <a:lumMod val="50000"/>
@@ -9990,7 +9661,7 @@
           <a:p>
             <a:pPr algn="just"/>
             <a:r>
-              <a:rPr lang="pt-PT" dirty="0" smtClean="0">
+              <a:rPr lang="pt-PT" dirty="0">
                 <a:solidFill>
                   <a:schemeClr val="accent1">
                     <a:lumMod val="50000"/>
@@ -10006,7 +9677,7 @@
               <a:buChar char="•"/>
             </a:pPr>
             <a:r>
-              <a:rPr lang="pt-PT" dirty="0" smtClean="0">
+              <a:rPr lang="pt-PT" dirty="0">
                 <a:solidFill>
                   <a:schemeClr val="accent1">
                     <a:lumMod val="50000"/>
@@ -10022,7 +9693,7 @@
               <a:buChar char="•"/>
             </a:pPr>
             <a:r>
-              <a:rPr lang="pt-PT" dirty="0" smtClean="0">
+              <a:rPr lang="pt-PT" dirty="0">
                 <a:solidFill>
                   <a:schemeClr val="accent1">
                     <a:lumMod val="50000"/>
@@ -10038,7 +9709,7 @@
               <a:buChar char="•"/>
             </a:pPr>
             <a:r>
-              <a:rPr lang="pt-PT" dirty="0" smtClean="0">
+              <a:rPr lang="pt-PT" dirty="0">
                 <a:solidFill>
                   <a:schemeClr val="accent1">
                     <a:lumMod val="50000"/>
@@ -10054,7 +9725,7 @@
               <a:buChar char="•"/>
             </a:pPr>
             <a:r>
-              <a:rPr lang="pt-PT" dirty="0" smtClean="0">
+              <a:rPr lang="pt-PT" dirty="0">
                 <a:solidFill>
                   <a:schemeClr val="accent1">
                     <a:lumMod val="50000"/>
@@ -10070,7 +9741,7 @@
               <a:buChar char="•"/>
             </a:pPr>
             <a:r>
-              <a:rPr lang="pt-PT" dirty="0" smtClean="0">
+              <a:rPr lang="pt-PT" dirty="0">
                 <a:solidFill>
                   <a:schemeClr val="accent1">
                     <a:lumMod val="50000"/>
@@ -10079,27 +9750,10 @@
               </a:rPr>
               <a:t>Eliminar dados.</a:t>
             </a:r>
-            <a:endParaRPr lang="pt-PT" dirty="0">
-              <a:solidFill>
-                <a:schemeClr val="accent1">
-                  <a:lumMod val="50000"/>
-                </a:schemeClr>
-              </a:solidFill>
-            </a:endParaRPr>
           </a:p>
           <a:p>
             <a:pPr algn="just"/>
             <a:r>
-              <a:rPr lang="pt-PT" dirty="0" smtClean="0">
-                <a:solidFill>
-                  <a:schemeClr val="accent1">
-                    <a:lumMod val="50000"/>
-                  </a:schemeClr>
-                </a:solidFill>
-              </a:rPr>
-              <a:t>Cada </a:t>
-            </a:r>
-            <a:r>
               <a:rPr lang="pt-PT" dirty="0">
                 <a:solidFill>
                   <a:schemeClr val="accent1">
@@ -10107,17 +9761,7 @@
                   </a:schemeClr>
                 </a:solidFill>
               </a:rPr>
-              <a:t>administrador</a:t>
-            </a:r>
-            <a:r>
-              <a:rPr lang="pt-PT" dirty="0" smtClean="0">
-                <a:solidFill>
-                  <a:schemeClr val="accent1">
-                    <a:lumMod val="50000"/>
-                  </a:schemeClr>
-                </a:solidFill>
-              </a:rPr>
-              <a:t> pode gerir o serviço de Newsletter de acordo com as seguintes ações:</a:t>
+              <a:t>Cada administrador pode gerir o serviço de Newsletter de acordo com as seguintes ações:</a:t>
             </a:r>
           </a:p>
           <a:p>
@@ -10126,7 +9770,7 @@
               <a:buChar char="•"/>
             </a:pPr>
             <a:r>
-              <a:rPr lang="pt-PT" dirty="0" smtClean="0">
+              <a:rPr lang="pt-PT" dirty="0">
                 <a:solidFill>
                   <a:schemeClr val="accent1">
                     <a:lumMod val="50000"/>
@@ -10142,7 +9786,7 @@
               <a:buChar char="•"/>
             </a:pPr>
             <a:r>
-              <a:rPr lang="pt-PT" dirty="0" smtClean="0">
+              <a:rPr lang="pt-PT" dirty="0">
                 <a:solidFill>
                   <a:schemeClr val="accent1">
                     <a:lumMod val="50000"/>
@@ -10158,7 +9802,7 @@
               <a:buChar char="•"/>
             </a:pPr>
             <a:r>
-              <a:rPr lang="pt-PT" dirty="0" smtClean="0">
+              <a:rPr lang="pt-PT" dirty="0">
                 <a:solidFill>
                   <a:schemeClr val="accent1">
                     <a:lumMod val="50000"/>
@@ -10174,7 +9818,7 @@
               <a:buChar char="•"/>
             </a:pPr>
             <a:r>
-              <a:rPr lang="pt-PT" dirty="0" smtClean="0">
+              <a:rPr lang="pt-PT" dirty="0">
                 <a:solidFill>
                   <a:schemeClr val="accent1">
                     <a:lumMod val="50000"/>
@@ -10190,7 +9834,7 @@
               <a:buChar char="•"/>
             </a:pPr>
             <a:r>
-              <a:rPr lang="pt-PT" dirty="0" smtClean="0">
+              <a:rPr lang="pt-PT" dirty="0">
                 <a:solidFill>
                   <a:schemeClr val="accent1">
                     <a:lumMod val="50000"/>
@@ -10245,32 +9889,15 @@
           <a:p>
             <a:pPr algn="ctr"/>
             <a:r>
-              <a:rPr lang="pt-PT" sz="2400" dirty="0" smtClean="0">
-                <a:solidFill>
-                  <a:schemeClr val="accent1">
-                    <a:lumMod val="50000"/>
-                  </a:schemeClr>
-                </a:solidFill>
-              </a:rPr>
-              <a:t>Requisitos Funcionais - </a:t>
-            </a:r>
-            <a:r>
-              <a:rPr lang="pt-PT" sz="2400" dirty="0" smtClean="0">
-                <a:solidFill>
-                  <a:schemeClr val="accent1">
-                    <a:lumMod val="50000"/>
-                  </a:schemeClr>
-                </a:solidFill>
-              </a:rPr>
-              <a:t>Administrador</a:t>
-            </a:r>
-            <a:endParaRPr lang="pt-PT" sz="2400" dirty="0">
-              <a:solidFill>
-                <a:schemeClr val="accent1">
-                  <a:lumMod val="50000"/>
-                </a:schemeClr>
-              </a:solidFill>
-            </a:endParaRPr>
+              <a:rPr lang="pt-PT" sz="2400" dirty="0">
+                <a:solidFill>
+                  <a:schemeClr val="accent1">
+                    <a:lumMod val="50000"/>
+                  </a:schemeClr>
+                </a:solidFill>
+              </a:rPr>
+              <a:t>Requisitos Funcionais - Administrador</a:t>
+            </a:r>
           </a:p>
         </p:txBody>
       </p:sp>
@@ -10332,13 +9959,6 @@
   <p:clrMapOvr>
     <a:masterClrMapping/>
   </p:clrMapOvr>
-  <p:timing>
-    <p:tnLst>
-      <p:par>
-        <p:cTn id="1" dur="indefinite" restart="never" nodeType="tmRoot"/>
-      </p:par>
-    </p:tnLst>
-  </p:timing>
 </p:sld>
 </file>
 
@@ -10503,7 +10123,7 @@
           <a:p>
             <a:pPr algn="just"/>
             <a:r>
-              <a:rPr lang="pt-PT" dirty="0" smtClean="0">
+              <a:rPr lang="pt-PT" dirty="0">
                 <a:solidFill>
                   <a:schemeClr val="accent1">
                     <a:lumMod val="50000"/>
@@ -10513,7 +10133,7 @@
               <a:t>A base de dados deve ser desenvolvida em </a:t>
             </a:r>
             <a:r>
-              <a:rPr lang="pt-PT" dirty="0" err="1" smtClean="0">
+              <a:rPr lang="pt-PT" dirty="0" err="1">
                 <a:solidFill>
                   <a:schemeClr val="accent1">
                     <a:lumMod val="50000"/>
@@ -10523,7 +10143,7 @@
               <a:t>Transact</a:t>
             </a:r>
             <a:r>
-              <a:rPr lang="pt-PT" dirty="0" smtClean="0">
+              <a:rPr lang="pt-PT" dirty="0">
                 <a:solidFill>
                   <a:schemeClr val="accent1">
                     <a:lumMod val="50000"/>
@@ -10536,7 +10156,7 @@
           <a:p>
             <a:pPr algn="just"/>
             <a:r>
-              <a:rPr lang="pt-PT" dirty="0" smtClean="0">
+              <a:rPr lang="pt-PT" dirty="0">
                 <a:solidFill>
                   <a:schemeClr val="accent1">
                     <a:lumMod val="50000"/>
@@ -10546,7 +10166,7 @@
               <a:t>A aplicação deve seguir uma arquitetura N-TIER de 3 camadas (</a:t>
             </a:r>
             <a:r>
-              <a:rPr lang="pt-PT" i="1" dirty="0" err="1" smtClean="0">
+              <a:rPr lang="pt-PT" i="1" dirty="0" err="1">
                 <a:solidFill>
                   <a:schemeClr val="accent1">
                     <a:lumMod val="50000"/>
@@ -10556,7 +10176,7 @@
               <a:t>User</a:t>
             </a:r>
             <a:r>
-              <a:rPr lang="pt-PT" i="1" dirty="0" smtClean="0">
+              <a:rPr lang="pt-PT" i="1" dirty="0">
                 <a:solidFill>
                   <a:schemeClr val="accent1">
                     <a:lumMod val="50000"/>
@@ -10566,7 +10186,7 @@
               <a:t> Interface, Business </a:t>
             </a:r>
             <a:r>
-              <a:rPr lang="pt-PT" i="1" dirty="0" err="1" smtClean="0">
+              <a:rPr lang="pt-PT" i="1" dirty="0" err="1">
                 <a:solidFill>
                   <a:schemeClr val="accent1">
                     <a:lumMod val="50000"/>
@@ -10576,7 +10196,7 @@
               <a:t>Logic</a:t>
             </a:r>
             <a:r>
-              <a:rPr lang="pt-PT" i="1" dirty="0" smtClean="0">
+              <a:rPr lang="pt-PT" i="1" dirty="0">
                 <a:solidFill>
                   <a:schemeClr val="accent1">
                     <a:lumMod val="50000"/>
@@ -10586,7 +10206,7 @@
               <a:t> </a:t>
             </a:r>
             <a:r>
-              <a:rPr lang="pt-PT" i="1" dirty="0" err="1" smtClean="0">
+              <a:rPr lang="pt-PT" i="1" dirty="0" err="1">
                 <a:solidFill>
                   <a:schemeClr val="accent1">
                     <a:lumMod val="50000"/>
@@ -10596,7 +10216,7 @@
               <a:t>Layer</a:t>
             </a:r>
             <a:r>
-              <a:rPr lang="pt-PT" i="1" dirty="0" smtClean="0">
+              <a:rPr lang="pt-PT" i="1" dirty="0">
                 <a:solidFill>
                   <a:schemeClr val="accent1">
                     <a:lumMod val="50000"/>
@@ -10606,7 +10226,7 @@
               <a:t>, Data Access </a:t>
             </a:r>
             <a:r>
-              <a:rPr lang="pt-PT" i="1" dirty="0" err="1" smtClean="0">
+              <a:rPr lang="pt-PT" i="1" dirty="0" err="1">
                 <a:solidFill>
                   <a:schemeClr val="accent1">
                     <a:lumMod val="50000"/>
@@ -10616,7 +10236,7 @@
               <a:t>Layer</a:t>
             </a:r>
             <a:r>
-              <a:rPr lang="pt-PT" dirty="0" smtClean="0">
+              <a:rPr lang="pt-PT" dirty="0">
                 <a:solidFill>
                   <a:schemeClr val="accent1">
                     <a:lumMod val="50000"/>
@@ -10629,7 +10249,7 @@
           <a:p>
             <a:pPr algn="just"/>
             <a:r>
-              <a:rPr lang="pt-PT" dirty="0" smtClean="0">
+              <a:rPr lang="pt-PT" dirty="0">
                 <a:solidFill>
                   <a:schemeClr val="accent1">
                     <a:lumMod val="50000"/>
@@ -10639,7 +10259,7 @@
               <a:t>Deve ser utilizada a programação orientada a objetos (</a:t>
             </a:r>
             <a:r>
-              <a:rPr lang="pt-PT" i="1" dirty="0" err="1" smtClean="0">
+              <a:rPr lang="pt-PT" i="1" dirty="0" err="1">
                 <a:solidFill>
                   <a:schemeClr val="accent1">
                     <a:lumMod val="50000"/>
@@ -10649,7 +10269,7 @@
               <a:t>Object-oriented</a:t>
             </a:r>
             <a:r>
-              <a:rPr lang="pt-PT" i="1" dirty="0" smtClean="0">
+              <a:rPr lang="pt-PT" i="1" dirty="0">
                 <a:solidFill>
                   <a:schemeClr val="accent1">
                     <a:lumMod val="50000"/>
@@ -10659,7 +10279,7 @@
               <a:t> </a:t>
             </a:r>
             <a:r>
-              <a:rPr lang="pt-PT" i="1" dirty="0" err="1" smtClean="0">
+              <a:rPr lang="pt-PT" i="1" dirty="0" err="1">
                 <a:solidFill>
                   <a:schemeClr val="accent1">
                     <a:lumMod val="50000"/>
@@ -10669,7 +10289,7 @@
               <a:t>Programming</a:t>
             </a:r>
             <a:r>
-              <a:rPr lang="pt-PT" dirty="0" smtClean="0">
+              <a:rPr lang="pt-PT" dirty="0">
                 <a:solidFill>
                   <a:schemeClr val="accent1">
                     <a:lumMod val="50000"/>
@@ -10724,7 +10344,7 @@
           <a:p>
             <a:pPr algn="ctr"/>
             <a:r>
-              <a:rPr lang="pt-PT" sz="2400" dirty="0" smtClean="0">
+              <a:rPr lang="pt-PT" sz="2400" dirty="0">
                 <a:solidFill>
                   <a:schemeClr val="accent1">
                     <a:lumMod val="50000"/>
@@ -10733,13 +10353,6 @@
               </a:rPr>
               <a:t>Requisitos Não Funcionais</a:t>
             </a:r>
-            <a:endParaRPr lang="pt-PT" sz="2400" dirty="0">
-              <a:solidFill>
-                <a:schemeClr val="accent1">
-                  <a:lumMod val="50000"/>
-                </a:schemeClr>
-              </a:solidFill>
-            </a:endParaRPr>
           </a:p>
         </p:txBody>
       </p:sp>
@@ -10801,13 +10414,6 @@
   <p:clrMapOvr>
     <a:masterClrMapping/>
   </p:clrMapOvr>
-  <p:timing>
-    <p:tnLst>
-      <p:par>
-        <p:cTn id="1" dur="indefinite" restart="never" nodeType="tmRoot"/>
-      </p:par>
-    </p:tnLst>
-  </p:timing>
 </p:sld>
 </file>
 
@@ -11098,13 +10704,6 @@
   <p:clrMapOvr>
     <a:masterClrMapping/>
   </p:clrMapOvr>
-  <p:timing>
-    <p:tnLst>
-      <p:par>
-        <p:cTn id="1" dur="indefinite" restart="never" nodeType="tmRoot"/>
-      </p:par>
-    </p:tnLst>
-  </p:timing>
 </p:sld>
 </file>
 
@@ -11395,13 +10994,6 @@
   <p:clrMapOvr>
     <a:masterClrMapping/>
   </p:clrMapOvr>
-  <p:timing>
-    <p:tnLst>
-      <p:par>
-        <p:cTn id="1" dur="indefinite" restart="never" nodeType="tmRoot"/>
-      </p:par>
-    </p:tnLst>
-  </p:timing>
 </p:sld>
 </file>
 
@@ -11615,7 +11207,7 @@
           <a:p>
             <a:pPr algn="ctr"/>
             <a:r>
-              <a:rPr lang="en-US" sz="2400" dirty="0" err="1" smtClean="0">
+              <a:rPr lang="en-US" sz="2400" dirty="0" err="1">
                 <a:solidFill>
                   <a:schemeClr val="accent1">
                     <a:lumMod val="50000"/>
@@ -11625,16 +11217,6 @@
               <a:t>Diagrama</a:t>
             </a:r>
             <a:r>
-              <a:rPr lang="en-US" sz="2400" dirty="0" smtClean="0">
-                <a:solidFill>
-                  <a:schemeClr val="accent1">
-                    <a:lumMod val="50000"/>
-                  </a:schemeClr>
-                </a:solidFill>
-              </a:rPr>
-              <a:t> </a:t>
-            </a:r>
-            <a:r>
               <a:rPr lang="en-US" sz="2400" dirty="0">
                 <a:solidFill>
                   <a:schemeClr val="accent1">
@@ -11642,7 +11224,7 @@
                   </a:schemeClr>
                 </a:solidFill>
               </a:rPr>
-              <a:t>de Contexto</a:t>
+              <a:t> de Contexto</a:t>
             </a:r>
             <a:endParaRPr lang="pt-PT" sz="2400" dirty="0">
               <a:solidFill>
@@ -11712,13 +11294,6 @@
   <p:clrMapOvr>
     <a:masterClrMapping/>
   </p:clrMapOvr>
-  <p:timing>
-    <p:tnLst>
-      <p:par>
-        <p:cTn id="1" dur="indefinite" restart="never" nodeType="tmRoot"/>
-      </p:par>
-    </p:tnLst>
-  </p:timing>
 </p:sld>
 </file>
 
@@ -11913,17 +11488,7 @@
                   </a:schemeClr>
                 </a:solidFill>
               </a:rPr>
-              <a:t> </a:t>
-            </a:r>
-            <a:r>
-              <a:rPr lang="en-US" sz="2400" dirty="0">
-                <a:solidFill>
-                  <a:schemeClr val="accent1">
-                    <a:lumMod val="50000"/>
-                  </a:schemeClr>
-                </a:solidFill>
-              </a:rPr>
-              <a:t>de Fluxo de Dados</a:t>
+              <a:t> de Fluxo de Dados</a:t>
             </a:r>
             <a:endParaRPr lang="pt-PT" sz="2400" dirty="0">
               <a:solidFill>
@@ -12029,13 +11594,6 @@
   <p:clrMapOvr>
     <a:masterClrMapping/>
   </p:clrMapOvr>
-  <p:timing>
-    <p:tnLst>
-      <p:par>
-        <p:cTn id="1" dur="indefinite" restart="never" nodeType="tmRoot"/>
-      </p:par>
-    </p:tnLst>
-  </p:timing>
 </p:sld>
 </file>
 

</xml_diff>

<commit_message>
SQL Script update teams flag (portugal)
</commit_message>
<xml_diff>
--- a/04 - Docs/01 - Project Manager/08 - UML/00 - Apresentação UML/UML Grupo 3.pptx
+++ b/04 - Docs/01 - Project Manager/08 - UML/00 - Apresentação UML/UML Grupo 3.pptx
@@ -5,7 +5,7 @@
     <p:sldMasterId id="2147483707" r:id="rId1"/>
   </p:sldMasterIdLst>
   <p:notesMasterIdLst>
-    <p:notesMasterId r:id="rId26"/>
+    <p:notesMasterId r:id="rId27"/>
   </p:notesMasterIdLst>
   <p:sldIdLst>
     <p:sldId id="256" r:id="rId2"/>
@@ -27,11 +27,12 @@
     <p:sldId id="270" r:id="rId18"/>
     <p:sldId id="261" r:id="rId19"/>
     <p:sldId id="277" r:id="rId20"/>
-    <p:sldId id="278" r:id="rId21"/>
-    <p:sldId id="279" r:id="rId22"/>
-    <p:sldId id="262" r:id="rId23"/>
-    <p:sldId id="280" r:id="rId24"/>
-    <p:sldId id="263" r:id="rId25"/>
+    <p:sldId id="281" r:id="rId21"/>
+    <p:sldId id="278" r:id="rId22"/>
+    <p:sldId id="279" r:id="rId23"/>
+    <p:sldId id="262" r:id="rId24"/>
+    <p:sldId id="280" r:id="rId25"/>
+    <p:sldId id="263" r:id="rId26"/>
   </p:sldIdLst>
   <p:sldSz cx="12192000" cy="6858000"/>
   <p:notesSz cx="6858000" cy="9144000"/>
@@ -7343,7 +7344,7 @@
         </p:blipFill>
         <p:spPr>
           <a:xfrm>
-            <a:off x="143711" y="117141"/>
+            <a:off x="143711" y="111930"/>
             <a:ext cx="2530772" cy="882369"/>
           </a:xfrm>
           <a:prstGeom prst="rect">
@@ -7365,7 +7366,7 @@
         </p:nvSpPr>
         <p:spPr>
           <a:xfrm>
-            <a:off x="0" y="6457890"/>
+            <a:off x="0" y="6421249"/>
             <a:ext cx="4717638" cy="400110"/>
           </a:xfrm>
           <a:prstGeom prst="rect">
@@ -7434,7 +7435,7 @@
           <p:cNvPr id="2" name="CaixaDeTexto 1">
             <a:extLst>
               <a:ext uri="{FF2B5EF4-FFF2-40B4-BE49-F238E27FC236}">
-                <a16:creationId xmlns:a16="http://schemas.microsoft.com/office/drawing/2014/main" id="{AFE48F3C-616A-4124-A80C-DB03BC000DE9}"/>
+                <a16:creationId xmlns:a16="http://schemas.microsoft.com/office/drawing/2014/main" id="{DED64B3C-BD7E-49D6-9BF6-FB29863CD7DD}"/>
               </a:ext>
             </a:extLst>
           </p:cNvPr>
@@ -7443,193 +7444,8 @@
         </p:nvSpPr>
         <p:spPr>
           <a:xfrm>
-            <a:off x="1070771" y="2159039"/>
-            <a:ext cx="10289220" cy="3139321"/>
-          </a:xfrm>
-          <a:prstGeom prst="rect">
-            <a:avLst/>
-          </a:prstGeom>
-          <a:noFill/>
-        </p:spPr>
-        <p:txBody>
-          <a:bodyPr wrap="square" rtlCol="0">
-            <a:spAutoFit/>
-          </a:bodyPr>
-          <a:lstStyle/>
-          <a:p>
-            <a:r>
-              <a:rPr lang="pt-PT" sz="2400" b="1" dirty="0">
-                <a:solidFill>
-                  <a:schemeClr val="accent1">
-                    <a:lumMod val="50000"/>
-                  </a:schemeClr>
-                </a:solidFill>
-              </a:rPr>
-              <a:t>Pré-Condição:</a:t>
-            </a:r>
-          </a:p>
-          <a:p>
-            <a:pPr lvl="0"/>
-            <a:r>
-              <a:rPr lang="pt-PT" dirty="0">
-                <a:solidFill>
-                  <a:schemeClr val="accent1">
-                    <a:lumMod val="50000"/>
-                  </a:schemeClr>
-                </a:solidFill>
-              </a:rPr>
-              <a:t>	O utilizador tem de estar autenticado.</a:t>
-            </a:r>
-            <a:endParaRPr lang="pt-PT" sz="2400" b="1" dirty="0">
-              <a:solidFill>
-                <a:schemeClr val="accent1">
-                  <a:lumMod val="50000"/>
-                </a:schemeClr>
-              </a:solidFill>
-            </a:endParaRPr>
-          </a:p>
-          <a:p>
-            <a:r>
-              <a:rPr lang="pt-PT" sz="2400" b="1" dirty="0">
-                <a:solidFill>
-                  <a:schemeClr val="accent1">
-                    <a:lumMod val="50000"/>
-                  </a:schemeClr>
-                </a:solidFill>
-              </a:rPr>
-              <a:t>Descrição:</a:t>
-            </a:r>
-          </a:p>
-          <a:p>
-            <a:pPr marL="1257300" lvl="2" indent="-342900">
-              <a:buFont typeface="+mj-lt"/>
-              <a:buAutoNum type="arabicPeriod"/>
-            </a:pPr>
-            <a:r>
-              <a:rPr lang="pt-PT" dirty="0">
-                <a:solidFill>
-                  <a:schemeClr val="accent1">
-                    <a:lumMod val="50000"/>
-                  </a:schemeClr>
-                </a:solidFill>
-              </a:rPr>
-              <a:t>O utilizador seleciona a opção de visualizar o seu perfil.</a:t>
-            </a:r>
-          </a:p>
-          <a:p>
-            <a:pPr marL="1257300" lvl="2" indent="-342900">
-              <a:buFont typeface="+mj-lt"/>
-              <a:buAutoNum type="arabicPeriod"/>
-            </a:pPr>
-            <a:r>
-              <a:rPr lang="pt-PT" dirty="0">
-                <a:solidFill>
-                  <a:schemeClr val="accent1">
-                    <a:lumMod val="50000"/>
-                  </a:schemeClr>
-                </a:solidFill>
-              </a:rPr>
-              <a:t>A página do perfil do utilizador é mostrada.</a:t>
-            </a:r>
-          </a:p>
-          <a:p>
-            <a:pPr marL="1257300" lvl="2" indent="-342900">
-              <a:buFont typeface="+mj-lt"/>
-              <a:buAutoNum type="arabicPeriod"/>
-            </a:pPr>
-            <a:r>
-              <a:rPr lang="pt-PT" dirty="0">
-                <a:solidFill>
-                  <a:schemeClr val="accent1">
-                    <a:lumMod val="50000"/>
-                  </a:schemeClr>
-                </a:solidFill>
-              </a:rPr>
-              <a:t>O utilizador seleciona o botão “Newsletter”.</a:t>
-            </a:r>
-          </a:p>
-          <a:p>
-            <a:pPr marL="1257300" lvl="2" indent="-342900">
-              <a:buFont typeface="+mj-lt"/>
-              <a:buAutoNum type="arabicPeriod"/>
-            </a:pPr>
-            <a:r>
-              <a:rPr lang="pt-PT" dirty="0">
-                <a:solidFill>
-                  <a:schemeClr val="accent1">
-                    <a:lumMod val="50000"/>
-                  </a:schemeClr>
-                </a:solidFill>
-              </a:rPr>
-              <a:t>O sistema valida a ação do utilizador e atualiza-o na base de dados.</a:t>
-            </a:r>
-          </a:p>
-          <a:p>
-            <a:pPr marL="1257300" lvl="2" indent="-342900">
-              <a:buFont typeface="+mj-lt"/>
-              <a:buAutoNum type="arabicPeriod"/>
-            </a:pPr>
-            <a:r>
-              <a:rPr lang="pt-PT" dirty="0">
-                <a:solidFill>
-                  <a:schemeClr val="accent1">
-                    <a:lumMod val="50000"/>
-                  </a:schemeClr>
-                </a:solidFill>
-              </a:rPr>
-              <a:t>Uma mensagem de sucesso é mostrada.</a:t>
-            </a:r>
-            <a:endParaRPr lang="pt-PT" sz="2400" b="1" dirty="0">
-              <a:solidFill>
-                <a:schemeClr val="accent1">
-                  <a:lumMod val="50000"/>
-                </a:schemeClr>
-              </a:solidFill>
-            </a:endParaRPr>
-          </a:p>
-          <a:p>
-            <a:r>
-              <a:rPr lang="pt-PT" sz="2400" b="1" dirty="0">
-                <a:solidFill>
-                  <a:schemeClr val="accent1">
-                    <a:lumMod val="50000"/>
-                  </a:schemeClr>
-                </a:solidFill>
-              </a:rPr>
-              <a:t>Pós-Condição:</a:t>
-            </a:r>
-          </a:p>
-          <a:p>
-            <a:pPr lvl="0"/>
-            <a:r>
-              <a:rPr lang="pt-PT" dirty="0">
-                <a:solidFill>
-                  <a:schemeClr val="accent1">
-                    <a:lumMod val="50000"/>
-                  </a:schemeClr>
-                </a:solidFill>
-              </a:rPr>
-              <a:t>	Em períodos regulares, o Utilizador receberá um e-mail com a Newsletter.</a:t>
-            </a:r>
-          </a:p>
-        </p:txBody>
-      </p:sp>
-      <p:sp>
-        <p:nvSpPr>
-          <p:cNvPr id="8" name="CaixaDeTexto 7">
-            <a:extLst>
-              <a:ext uri="{FF2B5EF4-FFF2-40B4-BE49-F238E27FC236}">
-                <a16:creationId xmlns:a16="http://schemas.microsoft.com/office/drawing/2014/main" id="{18BE4D7A-EDB0-4F0E-8A3F-3FBE1E77B25F}"/>
-              </a:ext>
-            </a:extLst>
-          </p:cNvPr>
-          <p:cNvSpPr txBox="1"/>
-          <p:nvPr/>
-        </p:nvSpPr>
-        <p:spPr>
-          <a:xfrm>
-            <a:off x="3025193" y="117141"/>
-            <a:ext cx="8974969" cy="523220"/>
+            <a:off x="3209925" y="111930"/>
+            <a:ext cx="8838364" cy="461665"/>
           </a:xfrm>
           <a:prstGeom prst="rect">
             <a:avLst/>
@@ -7657,26 +7473,6 @@
           <a:p>
             <a:pPr algn="ctr"/>
             <a:r>
-              <a:rPr lang="pt-PT" sz="2400" dirty="0">
-                <a:solidFill>
-                  <a:schemeClr val="accent1">
-                    <a:lumMod val="50000"/>
-                  </a:schemeClr>
-                </a:solidFill>
-              </a:rPr>
-              <a:t>Descrição estruturada </a:t>
-            </a:r>
-            <a:r>
-              <a:rPr lang="en-US" sz="2800" dirty="0">
-                <a:solidFill>
-                  <a:schemeClr val="accent1">
-                    <a:lumMod val="50000"/>
-                  </a:schemeClr>
-                </a:solidFill>
-              </a:rPr>
-              <a:t>(</a:t>
-            </a:r>
-            <a:r>
               <a:rPr lang="en-US" sz="2400" dirty="0" err="1">
                 <a:solidFill>
                   <a:schemeClr val="accent1">
@@ -7684,7 +7480,7 @@
                   </a:schemeClr>
                 </a:solidFill>
               </a:rPr>
-              <a:t>Subscrever</a:t>
+              <a:t>Fluxograma</a:t>
             </a:r>
             <a:r>
               <a:rPr lang="en-US" sz="2400" dirty="0">
@@ -7694,10 +7490,30 @@
                   </a:schemeClr>
                 </a:solidFill>
               </a:rPr>
-              <a:t> Newsletter</a:t>
-            </a:r>
-            <a:r>
-              <a:rPr lang="en-US" sz="2800" dirty="0">
+              <a:t> (</a:t>
+            </a:r>
+            <a:r>
+              <a:rPr lang="en-US" sz="2000" dirty="0" err="1">
+                <a:solidFill>
+                  <a:schemeClr val="accent1">
+                    <a:lumMod val="50000"/>
+                  </a:schemeClr>
+                </a:solidFill>
+              </a:rPr>
+              <a:t>Listar</a:t>
+            </a:r>
+            <a:r>
+              <a:rPr lang="en-US" sz="2000" dirty="0">
+                <a:solidFill>
+                  <a:schemeClr val="accent1">
+                    <a:lumMod val="50000"/>
+                  </a:schemeClr>
+                </a:solidFill>
+              </a:rPr>
+              <a:t> Próximos Jogos</a:t>
+            </a:r>
+            <a:r>
+              <a:rPr lang="en-US" sz="2400" dirty="0">
                 <a:solidFill>
                   <a:schemeClr val="accent1">
                     <a:lumMod val="50000"/>
@@ -7718,10 +7534,10 @@
       </p:sp>
       <p:sp>
         <p:nvSpPr>
-          <p:cNvPr id="9" name="CaixaDeTexto 8">
+          <p:cNvPr id="8" name="CaixaDeTexto 7">
             <a:extLst>
               <a:ext uri="{FF2B5EF4-FFF2-40B4-BE49-F238E27FC236}">
-                <a16:creationId xmlns:a16="http://schemas.microsoft.com/office/drawing/2014/main" id="{57E20148-8DBA-4CE4-A21D-91C4A866F103}"/>
+                <a16:creationId xmlns:a16="http://schemas.microsoft.com/office/drawing/2014/main" id="{2A5A36C4-47E9-4F0E-B209-F41870743278}"/>
               </a:ext>
             </a:extLst>
           </p:cNvPr>
@@ -7764,10 +7580,46 @@
           </a:p>
         </p:txBody>
       </p:sp>
+      <p:pic>
+        <p:nvPicPr>
+          <p:cNvPr id="4" name="Imagem 3">
+            <a:extLst>
+              <a:ext uri="{FF2B5EF4-FFF2-40B4-BE49-F238E27FC236}">
+                <a16:creationId xmlns:a16="http://schemas.microsoft.com/office/drawing/2014/main" id="{AF162A59-AF46-45C2-94EA-C85B5150A4D5}"/>
+              </a:ext>
+            </a:extLst>
+          </p:cNvPr>
+          <p:cNvPicPr>
+            <a:picLocks noChangeAspect="1"/>
+          </p:cNvPicPr>
+          <p:nvPr/>
+        </p:nvPicPr>
+        <p:blipFill>
+          <a:blip r:embed="rId3">
+            <a:extLst>
+              <a:ext uri="{28A0092B-C50C-407E-A947-70E740481C1C}">
+                <a14:useLocalDpi xmlns:a14="http://schemas.microsoft.com/office/drawing/2010/main" val="0"/>
+              </a:ext>
+            </a:extLst>
+          </a:blip>
+          <a:stretch>
+            <a:fillRect/>
+          </a:stretch>
+        </p:blipFill>
+        <p:spPr>
+          <a:xfrm>
+            <a:off x="4873841" y="1093378"/>
+            <a:ext cx="2689934" cy="5140633"/>
+          </a:xfrm>
+          <a:prstGeom prst="rect">
+            <a:avLst/>
+          </a:prstGeom>
+        </p:spPr>
+      </p:pic>
     </p:spTree>
     <p:extLst>
       <p:ext uri="{BB962C8B-B14F-4D97-AF65-F5344CB8AC3E}">
-        <p14:creationId xmlns:p14="http://schemas.microsoft.com/office/powerpoint/2010/main" val="1713125262"/>
+        <p14:creationId xmlns:p14="http://schemas.microsoft.com/office/powerpoint/2010/main" val="1268686814"/>
       </p:ext>
     </p:extLst>
   </p:cSld>
@@ -7922,8 +7774,8 @@
         </p:nvSpPr>
         <p:spPr>
           <a:xfrm>
-            <a:off x="1114314" y="3179793"/>
-            <a:ext cx="10289220" cy="1015663"/>
+            <a:off x="1070771" y="2159039"/>
+            <a:ext cx="10289220" cy="3139321"/>
           </a:xfrm>
           <a:prstGeom prst="rect">
             <a:avLst/>
@@ -7944,10 +7796,11 @@
                   </a:schemeClr>
                 </a:solidFill>
               </a:rPr>
-              <a:t>Cenário Secundário:</a:t>
-            </a:r>
-          </a:p>
-          <a:p>
+              <a:t>Pré-Condição:</a:t>
+            </a:r>
+          </a:p>
+          <a:p>
+            <a:pPr lvl="0"/>
             <a:r>
               <a:rPr lang="pt-PT" dirty="0">
                 <a:solidFill>
@@ -7956,7 +7809,138 @@
                   </a:schemeClr>
                 </a:solidFill>
               </a:rPr>
-              <a:t>	3.1. Se algo inesperado acontecer, uma mensagem de erro será mostrada ao utilizador e volta para o ponto 2.</a:t>
+              <a:t>	O utilizador tem de estar autenticado.</a:t>
+            </a:r>
+            <a:endParaRPr lang="pt-PT" sz="2400" b="1" dirty="0">
+              <a:solidFill>
+                <a:schemeClr val="accent1">
+                  <a:lumMod val="50000"/>
+                </a:schemeClr>
+              </a:solidFill>
+            </a:endParaRPr>
+          </a:p>
+          <a:p>
+            <a:r>
+              <a:rPr lang="pt-PT" sz="2400" b="1" dirty="0">
+                <a:solidFill>
+                  <a:schemeClr val="accent1">
+                    <a:lumMod val="50000"/>
+                  </a:schemeClr>
+                </a:solidFill>
+              </a:rPr>
+              <a:t>Descrição:</a:t>
+            </a:r>
+          </a:p>
+          <a:p>
+            <a:pPr marL="1257300" lvl="2" indent="-342900">
+              <a:buFont typeface="+mj-lt"/>
+              <a:buAutoNum type="arabicPeriod"/>
+            </a:pPr>
+            <a:r>
+              <a:rPr lang="pt-PT" dirty="0">
+                <a:solidFill>
+                  <a:schemeClr val="accent1">
+                    <a:lumMod val="50000"/>
+                  </a:schemeClr>
+                </a:solidFill>
+              </a:rPr>
+              <a:t>O utilizador seleciona a opção de visualizar o seu perfil.</a:t>
+            </a:r>
+          </a:p>
+          <a:p>
+            <a:pPr marL="1257300" lvl="2" indent="-342900">
+              <a:buFont typeface="+mj-lt"/>
+              <a:buAutoNum type="arabicPeriod"/>
+            </a:pPr>
+            <a:r>
+              <a:rPr lang="pt-PT" dirty="0">
+                <a:solidFill>
+                  <a:schemeClr val="accent1">
+                    <a:lumMod val="50000"/>
+                  </a:schemeClr>
+                </a:solidFill>
+              </a:rPr>
+              <a:t>A página do perfil do utilizador é mostrada.</a:t>
+            </a:r>
+          </a:p>
+          <a:p>
+            <a:pPr marL="1257300" lvl="2" indent="-342900">
+              <a:buFont typeface="+mj-lt"/>
+              <a:buAutoNum type="arabicPeriod"/>
+            </a:pPr>
+            <a:r>
+              <a:rPr lang="pt-PT" dirty="0">
+                <a:solidFill>
+                  <a:schemeClr val="accent1">
+                    <a:lumMod val="50000"/>
+                  </a:schemeClr>
+                </a:solidFill>
+              </a:rPr>
+              <a:t>O utilizador seleciona o botão “Newsletter”.</a:t>
+            </a:r>
+          </a:p>
+          <a:p>
+            <a:pPr marL="1257300" lvl="2" indent="-342900">
+              <a:buFont typeface="+mj-lt"/>
+              <a:buAutoNum type="arabicPeriod"/>
+            </a:pPr>
+            <a:r>
+              <a:rPr lang="pt-PT" dirty="0">
+                <a:solidFill>
+                  <a:schemeClr val="accent1">
+                    <a:lumMod val="50000"/>
+                  </a:schemeClr>
+                </a:solidFill>
+              </a:rPr>
+              <a:t>O sistema valida a ação do utilizador e atualiza-o na base de dados.</a:t>
+            </a:r>
+          </a:p>
+          <a:p>
+            <a:pPr marL="1257300" lvl="2" indent="-342900">
+              <a:buFont typeface="+mj-lt"/>
+              <a:buAutoNum type="arabicPeriod"/>
+            </a:pPr>
+            <a:r>
+              <a:rPr lang="pt-PT" dirty="0">
+                <a:solidFill>
+                  <a:schemeClr val="accent1">
+                    <a:lumMod val="50000"/>
+                  </a:schemeClr>
+                </a:solidFill>
+              </a:rPr>
+              <a:t>Uma mensagem de sucesso é mostrada.</a:t>
+            </a:r>
+            <a:endParaRPr lang="pt-PT" sz="2400" b="1" dirty="0">
+              <a:solidFill>
+                <a:schemeClr val="accent1">
+                  <a:lumMod val="50000"/>
+                </a:schemeClr>
+              </a:solidFill>
+            </a:endParaRPr>
+          </a:p>
+          <a:p>
+            <a:r>
+              <a:rPr lang="pt-PT" sz="2400" b="1" dirty="0">
+                <a:solidFill>
+                  <a:schemeClr val="accent1">
+                    <a:lumMod val="50000"/>
+                  </a:schemeClr>
+                </a:solidFill>
+              </a:rPr>
+              <a:t>Pós-Condição:</a:t>
+            </a:r>
+          </a:p>
+          <a:p>
+            <a:pPr lvl="0"/>
+            <a:r>
+              <a:rPr lang="pt-PT" dirty="0">
+                <a:solidFill>
+                  <a:schemeClr val="accent1">
+                    <a:lumMod val="50000"/>
+                  </a:schemeClr>
+                </a:solidFill>
+              </a:rPr>
+              <a:t>	Em períodos regulares, o Utilizador receberá um e-mail com a Newsletter.</a:t>
             </a:r>
           </a:p>
         </p:txBody>
@@ -8114,7 +8098,7 @@
     </p:spTree>
     <p:extLst>
       <p:ext uri="{BB962C8B-B14F-4D97-AF65-F5344CB8AC3E}">
-        <p14:creationId xmlns:p14="http://schemas.microsoft.com/office/powerpoint/2010/main" val="1135867185"/>
+        <p14:creationId xmlns:p14="http://schemas.microsoft.com/office/powerpoint/2010/main" val="1713125262"/>
       </p:ext>
     </p:extLst>
   </p:cSld>
@@ -8169,7 +8153,7 @@
         </p:blipFill>
         <p:spPr>
           <a:xfrm>
-            <a:off x="143711" y="111930"/>
+            <a:off x="143711" y="117141"/>
             <a:ext cx="2530772" cy="882369"/>
           </a:xfrm>
           <a:prstGeom prst="rect">
@@ -8191,7 +8175,7 @@
         </p:nvSpPr>
         <p:spPr>
           <a:xfrm>
-            <a:off x="0" y="6421249"/>
+            <a:off x="0" y="6457890"/>
             <a:ext cx="4717638" cy="400110"/>
           </a:xfrm>
           <a:prstGeom prst="rect">
@@ -8260,7 +8244,7 @@
           <p:cNvPr id="2" name="CaixaDeTexto 1">
             <a:extLst>
               <a:ext uri="{FF2B5EF4-FFF2-40B4-BE49-F238E27FC236}">
-                <a16:creationId xmlns:a16="http://schemas.microsoft.com/office/drawing/2014/main" id="{DED64B3C-BD7E-49D6-9BF6-FB29863CD7DD}"/>
+                <a16:creationId xmlns:a16="http://schemas.microsoft.com/office/drawing/2014/main" id="{AFE48F3C-616A-4124-A80C-DB03BC000DE9}"/>
               </a:ext>
             </a:extLst>
           </p:cNvPr>
@@ -8269,8 +8253,61 @@
         </p:nvSpPr>
         <p:spPr>
           <a:xfrm>
-            <a:off x="3209925" y="111930"/>
-            <a:ext cx="8838364" cy="461665"/>
+            <a:off x="1114314" y="3179793"/>
+            <a:ext cx="10289220" cy="1015663"/>
+          </a:xfrm>
+          <a:prstGeom prst="rect">
+            <a:avLst/>
+          </a:prstGeom>
+          <a:noFill/>
+        </p:spPr>
+        <p:txBody>
+          <a:bodyPr wrap="square" rtlCol="0">
+            <a:spAutoFit/>
+          </a:bodyPr>
+          <a:lstStyle/>
+          <a:p>
+            <a:r>
+              <a:rPr lang="pt-PT" sz="2400" b="1" dirty="0">
+                <a:solidFill>
+                  <a:schemeClr val="accent1">
+                    <a:lumMod val="50000"/>
+                  </a:schemeClr>
+                </a:solidFill>
+              </a:rPr>
+              <a:t>Cenário Secundário:</a:t>
+            </a:r>
+          </a:p>
+          <a:p>
+            <a:r>
+              <a:rPr lang="pt-PT" dirty="0">
+                <a:solidFill>
+                  <a:schemeClr val="accent1">
+                    <a:lumMod val="50000"/>
+                  </a:schemeClr>
+                </a:solidFill>
+              </a:rPr>
+              <a:t>	3.1. Se algo inesperado acontecer, uma mensagem de erro será mostrada ao utilizador e volta para o ponto 2.</a:t>
+            </a:r>
+          </a:p>
+        </p:txBody>
+      </p:sp>
+      <p:sp>
+        <p:nvSpPr>
+          <p:cNvPr id="8" name="CaixaDeTexto 7">
+            <a:extLst>
+              <a:ext uri="{FF2B5EF4-FFF2-40B4-BE49-F238E27FC236}">
+                <a16:creationId xmlns:a16="http://schemas.microsoft.com/office/drawing/2014/main" id="{18BE4D7A-EDB0-4F0E-8A3F-3FBE1E77B25F}"/>
+              </a:ext>
+            </a:extLst>
+          </p:cNvPr>
+          <p:cNvSpPr txBox="1"/>
+          <p:nvPr/>
+        </p:nvSpPr>
+        <p:spPr>
+          <a:xfrm>
+            <a:off x="3025193" y="117141"/>
+            <a:ext cx="8974969" cy="523220"/>
           </a:xfrm>
           <a:prstGeom prst="rect">
             <a:avLst/>
@@ -8298,6 +8335,36 @@
           <a:p>
             <a:pPr algn="ctr"/>
             <a:r>
+              <a:rPr lang="pt-PT" sz="2400" dirty="0">
+                <a:solidFill>
+                  <a:schemeClr val="accent1">
+                    <a:lumMod val="50000"/>
+                  </a:schemeClr>
+                </a:solidFill>
+              </a:rPr>
+              <a:t>Descrição estruturada </a:t>
+            </a:r>
+            <a:r>
+              <a:rPr lang="en-US" sz="2800" dirty="0">
+                <a:solidFill>
+                  <a:schemeClr val="accent1">
+                    <a:lumMod val="50000"/>
+                  </a:schemeClr>
+                </a:solidFill>
+              </a:rPr>
+              <a:t>(</a:t>
+            </a:r>
+            <a:r>
+              <a:rPr lang="en-US" sz="2400" dirty="0" err="1">
+                <a:solidFill>
+                  <a:schemeClr val="accent1">
+                    <a:lumMod val="50000"/>
+                  </a:schemeClr>
+                </a:solidFill>
+              </a:rPr>
+              <a:t>Subscrever</a:t>
+            </a:r>
+            <a:r>
               <a:rPr lang="en-US" sz="2400" dirty="0">
                 <a:solidFill>
                   <a:schemeClr val="accent1">
@@ -8305,20 +8372,10 @@
                   </a:schemeClr>
                 </a:solidFill>
               </a:rPr>
-              <a:t>Diagrama de Sequência (</a:t>
-            </a:r>
-            <a:r>
-              <a:rPr lang="pt-PT" sz="2000" dirty="0">
-                <a:solidFill>
-                  <a:schemeClr val="accent1">
-                    <a:lumMod val="50000"/>
-                  </a:schemeClr>
-                </a:solidFill>
-              </a:rPr>
-              <a:t>Subscrever Newsletter</a:t>
-            </a:r>
-            <a:r>
-              <a:rPr lang="en-US" sz="2400" dirty="0">
+              <a:t> Newsletter</a:t>
+            </a:r>
+            <a:r>
+              <a:rPr lang="en-US" sz="2800" dirty="0">
                 <a:solidFill>
                   <a:schemeClr val="accent1">
                     <a:lumMod val="50000"/>
@@ -8337,48 +8394,12 @@
           </a:p>
         </p:txBody>
       </p:sp>
-      <p:pic>
-        <p:nvPicPr>
-          <p:cNvPr id="8" name="Imagem 7">
+      <p:sp>
+        <p:nvSpPr>
+          <p:cNvPr id="9" name="CaixaDeTexto 8">
             <a:extLst>
               <a:ext uri="{FF2B5EF4-FFF2-40B4-BE49-F238E27FC236}">
-                <a16:creationId xmlns:a16="http://schemas.microsoft.com/office/drawing/2014/main" id="{D985ED82-EFFE-4399-8654-B09381049FBB}"/>
-              </a:ext>
-            </a:extLst>
-          </p:cNvPr>
-          <p:cNvPicPr>
-            <a:picLocks noChangeAspect="1"/>
-          </p:cNvPicPr>
-          <p:nvPr/>
-        </p:nvPicPr>
-        <p:blipFill>
-          <a:blip r:embed="rId3">
-            <a:extLst>
-              <a:ext uri="{28A0092B-C50C-407E-A947-70E740481C1C}">
-                <a14:useLocalDpi xmlns:a14="http://schemas.microsoft.com/office/drawing/2010/main" val="0"/>
-              </a:ext>
-            </a:extLst>
-          </a:blip>
-          <a:stretch>
-            <a:fillRect/>
-          </a:stretch>
-        </p:blipFill>
-        <p:spPr>
-          <a:xfrm>
-            <a:off x="2495550" y="1514474"/>
-            <a:ext cx="7762875" cy="4695825"/>
-          </a:xfrm>
-          <a:prstGeom prst="rect">
-            <a:avLst/>
-          </a:prstGeom>
-        </p:spPr>
-      </p:pic>
-      <p:sp>
-        <p:nvSpPr>
-          <p:cNvPr id="9" name="CaixaDeTexto 8">
-            <a:extLst>
-              <a:ext uri="{FF2B5EF4-FFF2-40B4-BE49-F238E27FC236}">
-                <a16:creationId xmlns:a16="http://schemas.microsoft.com/office/drawing/2014/main" id="{379F74CD-C452-4201-B127-34544A496AC2}"/>
+                <a16:creationId xmlns:a16="http://schemas.microsoft.com/office/drawing/2014/main" id="{57E20148-8DBA-4CE4-A21D-91C4A866F103}"/>
               </a:ext>
             </a:extLst>
           </p:cNvPr>
@@ -8424,7 +8445,7 @@
     </p:spTree>
     <p:extLst>
       <p:ext uri="{BB962C8B-B14F-4D97-AF65-F5344CB8AC3E}">
-        <p14:creationId xmlns:p14="http://schemas.microsoft.com/office/powerpoint/2010/main" val="1405741742"/>
+        <p14:creationId xmlns:p14="http://schemas.microsoft.com/office/powerpoint/2010/main" val="1135867185"/>
       </p:ext>
     </p:extLst>
   </p:cSld>
@@ -8580,7 +8601,7 @@
         <p:spPr>
           <a:xfrm>
             <a:off x="3209925" y="111930"/>
-            <a:ext cx="8838364" cy="523220"/>
+            <a:ext cx="8838364" cy="461665"/>
           </a:xfrm>
           <a:prstGeom prst="rect">
             <a:avLst/>
@@ -8608,6 +8629,316 @@
           <a:p>
             <a:pPr algn="ctr"/>
             <a:r>
+              <a:rPr lang="en-US" sz="2400" dirty="0">
+                <a:solidFill>
+                  <a:schemeClr val="accent1">
+                    <a:lumMod val="50000"/>
+                  </a:schemeClr>
+                </a:solidFill>
+              </a:rPr>
+              <a:t>Diagrama de Sequência (</a:t>
+            </a:r>
+            <a:r>
+              <a:rPr lang="pt-PT" sz="2000" dirty="0">
+                <a:solidFill>
+                  <a:schemeClr val="accent1">
+                    <a:lumMod val="50000"/>
+                  </a:schemeClr>
+                </a:solidFill>
+              </a:rPr>
+              <a:t>Subscrever Newsletter</a:t>
+            </a:r>
+            <a:r>
+              <a:rPr lang="en-US" sz="2400" dirty="0">
+                <a:solidFill>
+                  <a:schemeClr val="accent1">
+                    <a:lumMod val="50000"/>
+                  </a:schemeClr>
+                </a:solidFill>
+              </a:rPr>
+              <a:t>)</a:t>
+            </a:r>
+            <a:endParaRPr lang="pt-PT" sz="2400" dirty="0">
+              <a:solidFill>
+                <a:schemeClr val="accent1">
+                  <a:lumMod val="50000"/>
+                </a:schemeClr>
+              </a:solidFill>
+            </a:endParaRPr>
+          </a:p>
+        </p:txBody>
+      </p:sp>
+      <p:pic>
+        <p:nvPicPr>
+          <p:cNvPr id="8" name="Imagem 7">
+            <a:extLst>
+              <a:ext uri="{FF2B5EF4-FFF2-40B4-BE49-F238E27FC236}">
+                <a16:creationId xmlns:a16="http://schemas.microsoft.com/office/drawing/2014/main" id="{D985ED82-EFFE-4399-8654-B09381049FBB}"/>
+              </a:ext>
+            </a:extLst>
+          </p:cNvPr>
+          <p:cNvPicPr>
+            <a:picLocks noChangeAspect="1"/>
+          </p:cNvPicPr>
+          <p:nvPr/>
+        </p:nvPicPr>
+        <p:blipFill>
+          <a:blip r:embed="rId3">
+            <a:extLst>
+              <a:ext uri="{28A0092B-C50C-407E-A947-70E740481C1C}">
+                <a14:useLocalDpi xmlns:a14="http://schemas.microsoft.com/office/drawing/2010/main" val="0"/>
+              </a:ext>
+            </a:extLst>
+          </a:blip>
+          <a:stretch>
+            <a:fillRect/>
+          </a:stretch>
+        </p:blipFill>
+        <p:spPr>
+          <a:xfrm>
+            <a:off x="2495550" y="1514474"/>
+            <a:ext cx="7762875" cy="4695825"/>
+          </a:xfrm>
+          <a:prstGeom prst="rect">
+            <a:avLst/>
+          </a:prstGeom>
+        </p:spPr>
+      </p:pic>
+      <p:sp>
+        <p:nvSpPr>
+          <p:cNvPr id="9" name="CaixaDeTexto 8">
+            <a:extLst>
+              <a:ext uri="{FF2B5EF4-FFF2-40B4-BE49-F238E27FC236}">
+                <a16:creationId xmlns:a16="http://schemas.microsoft.com/office/drawing/2014/main" id="{379F74CD-C452-4201-B127-34544A496AC2}"/>
+              </a:ext>
+            </a:extLst>
+          </p:cNvPr>
+          <p:cNvSpPr txBox="1"/>
+          <p:nvPr/>
+        </p:nvSpPr>
+        <p:spPr>
+          <a:xfrm>
+            <a:off x="9301337" y="6457890"/>
+            <a:ext cx="2890663" cy="400110"/>
+          </a:xfrm>
+          <a:prstGeom prst="rect">
+            <a:avLst/>
+          </a:prstGeom>
+          <a:noFill/>
+        </p:spPr>
+        <p:txBody>
+          <a:bodyPr wrap="none" rtlCol="0">
+            <a:spAutoFit/>
+          </a:bodyPr>
+          <a:lstStyle/>
+          <a:p>
+            <a:r>
+              <a:rPr lang="en-US" sz="2000" dirty="0">
+                <a:solidFill>
+                  <a:schemeClr val="accent1">
+                    <a:lumMod val="50000"/>
+                  </a:schemeClr>
+                </a:solidFill>
+              </a:rPr>
+              <a:t>Projecto Final SPAD - UML</a:t>
+            </a:r>
+            <a:endParaRPr lang="pt-PT" sz="2000" dirty="0">
+              <a:solidFill>
+                <a:schemeClr val="accent1">
+                  <a:lumMod val="50000"/>
+                </a:schemeClr>
+              </a:solidFill>
+            </a:endParaRPr>
+          </a:p>
+        </p:txBody>
+      </p:sp>
+    </p:spTree>
+    <p:extLst>
+      <p:ext uri="{BB962C8B-B14F-4D97-AF65-F5344CB8AC3E}">
+        <p14:creationId xmlns:p14="http://schemas.microsoft.com/office/powerpoint/2010/main" val="1405741742"/>
+      </p:ext>
+    </p:extLst>
+  </p:cSld>
+  <p:clrMapOvr>
+    <a:masterClrMapping/>
+  </p:clrMapOvr>
+</p:sld>
+</file>
+
+<file path=ppt/slides/slide24.xml><?xml version="1.0" encoding="utf-8"?>
+<p:sld xmlns:a="http://schemas.openxmlformats.org/drawingml/2006/main" xmlns:r="http://schemas.openxmlformats.org/officeDocument/2006/relationships" xmlns:p="http://schemas.openxmlformats.org/presentationml/2006/main">
+  <p:cSld>
+    <p:spTree>
+      <p:nvGrpSpPr>
+        <p:cNvPr id="1" name=""/>
+        <p:cNvGrpSpPr/>
+        <p:nvPr/>
+      </p:nvGrpSpPr>
+      <p:grpSpPr>
+        <a:xfrm>
+          <a:off x="0" y="0"/>
+          <a:ext cx="0" cy="0"/>
+          <a:chOff x="0" y="0"/>
+          <a:chExt cx="0" cy="0"/>
+        </a:xfrm>
+      </p:grpSpPr>
+      <p:pic>
+        <p:nvPicPr>
+          <p:cNvPr id="5" name="Imagem 4">
+            <a:extLst>
+              <a:ext uri="{FF2B5EF4-FFF2-40B4-BE49-F238E27FC236}">
+                <a16:creationId xmlns:a16="http://schemas.microsoft.com/office/drawing/2014/main" id="{003B6523-7228-4E24-BF75-D68FF276CDDE}"/>
+              </a:ext>
+            </a:extLst>
+          </p:cNvPr>
+          <p:cNvPicPr>
+            <a:picLocks noChangeAspect="1"/>
+          </p:cNvPicPr>
+          <p:nvPr/>
+        </p:nvPicPr>
+        <p:blipFill>
+          <a:blip r:embed="rId2" cstate="hqprint">
+            <a:extLst>
+              <a:ext uri="{28A0092B-C50C-407E-A947-70E740481C1C}">
+                <a14:useLocalDpi xmlns:a14="http://schemas.microsoft.com/office/drawing/2010/main" val="0"/>
+              </a:ext>
+            </a:extLst>
+          </a:blip>
+          <a:stretch>
+            <a:fillRect/>
+          </a:stretch>
+        </p:blipFill>
+        <p:spPr>
+          <a:xfrm>
+            <a:off x="143711" y="111930"/>
+            <a:ext cx="2530772" cy="882369"/>
+          </a:xfrm>
+          <a:prstGeom prst="rect">
+            <a:avLst/>
+          </a:prstGeom>
+        </p:spPr>
+      </p:pic>
+      <p:sp>
+        <p:nvSpPr>
+          <p:cNvPr id="6" name="CaixaDeTexto 5">
+            <a:extLst>
+              <a:ext uri="{FF2B5EF4-FFF2-40B4-BE49-F238E27FC236}">
+                <a16:creationId xmlns:a16="http://schemas.microsoft.com/office/drawing/2014/main" id="{0D8912D2-B081-46A3-B4A0-334D4495E6F0}"/>
+              </a:ext>
+            </a:extLst>
+          </p:cNvPr>
+          <p:cNvSpPr txBox="1"/>
+          <p:nvPr/>
+        </p:nvSpPr>
+        <p:spPr>
+          <a:xfrm>
+            <a:off x="0" y="6421249"/>
+            <a:ext cx="4717638" cy="400110"/>
+          </a:xfrm>
+          <a:prstGeom prst="rect">
+            <a:avLst/>
+          </a:prstGeom>
+          <a:noFill/>
+        </p:spPr>
+        <p:txBody>
+          <a:bodyPr wrap="none" rtlCol="0">
+            <a:spAutoFit/>
+          </a:bodyPr>
+          <a:lstStyle/>
+          <a:p>
+            <a:r>
+              <a:rPr lang="en-US" sz="2000" dirty="0">
+                <a:solidFill>
+                  <a:schemeClr val="accent1">
+                    <a:lumMod val="50000"/>
+                  </a:schemeClr>
+                </a:solidFill>
+              </a:rPr>
+              <a:t>TPSIP_10.17 </a:t>
+            </a:r>
+            <a:r>
+              <a:rPr lang="en-US" sz="1400" dirty="0">
+                <a:solidFill>
+                  <a:schemeClr val="accent1">
+                    <a:lumMod val="50000"/>
+                  </a:schemeClr>
+                </a:solidFill>
+              </a:rPr>
+              <a:t>-</a:t>
+            </a:r>
+            <a:r>
+              <a:rPr lang="en-US" dirty="0">
+                <a:solidFill>
+                  <a:schemeClr val="accent1">
+                    <a:lumMod val="50000"/>
+                  </a:schemeClr>
+                </a:solidFill>
+              </a:rPr>
+              <a:t> </a:t>
+            </a:r>
+            <a:r>
+              <a:rPr lang="en-US" sz="1400" dirty="0">
+                <a:solidFill>
+                  <a:schemeClr val="accent1">
+                    <a:lumMod val="50000"/>
+                  </a:schemeClr>
+                </a:solidFill>
+              </a:rPr>
+              <a:t>Bruno Ferreira, João Santos e Luís Passeira</a:t>
+            </a:r>
+            <a:endParaRPr lang="pt-PT" sz="1400" dirty="0">
+              <a:solidFill>
+                <a:schemeClr val="accent1">
+                  <a:lumMod val="50000"/>
+                </a:schemeClr>
+              </a:solidFill>
+            </a:endParaRPr>
+          </a:p>
+        </p:txBody>
+      </p:sp>
+      <p:sp>
+        <p:nvSpPr>
+          <p:cNvPr id="2" name="CaixaDeTexto 1">
+            <a:extLst>
+              <a:ext uri="{FF2B5EF4-FFF2-40B4-BE49-F238E27FC236}">
+                <a16:creationId xmlns:a16="http://schemas.microsoft.com/office/drawing/2014/main" id="{DED64B3C-BD7E-49D6-9BF6-FB29863CD7DD}"/>
+              </a:ext>
+            </a:extLst>
+          </p:cNvPr>
+          <p:cNvSpPr txBox="1"/>
+          <p:nvPr/>
+        </p:nvSpPr>
+        <p:spPr>
+          <a:xfrm>
+            <a:off x="3209925" y="111930"/>
+            <a:ext cx="8838364" cy="523220"/>
+          </a:xfrm>
+          <a:prstGeom prst="rect">
+            <a:avLst/>
+          </a:prstGeom>
+        </p:spPr>
+        <p:style>
+          <a:lnRef idx="0">
+            <a:schemeClr val="accent4"/>
+          </a:lnRef>
+          <a:fillRef idx="3">
+            <a:schemeClr val="accent4"/>
+          </a:fillRef>
+          <a:effectRef idx="3">
+            <a:schemeClr val="accent4"/>
+          </a:effectRef>
+          <a:fontRef idx="minor">
+            <a:schemeClr val="lt1"/>
+          </a:fontRef>
+        </p:style>
+        <p:txBody>
+          <a:bodyPr wrap="square" rtlCol="0">
+            <a:spAutoFit/>
+          </a:bodyPr>
+          <a:lstStyle/>
+          <a:p>
+            <a:pPr algn="ctr"/>
+            <a:r>
               <a:rPr lang="en-US" sz="2400" dirty="0" err="1">
                 <a:solidFill>
                   <a:schemeClr val="accent1">
@@ -8768,7 +9099,7 @@
 </p:sld>
 </file>
 
-<file path=ppt/slides/slide24.xml><?xml version="1.0" encoding="utf-8"?>
+<file path=ppt/slides/slide25.xml><?xml version="1.0" encoding="utf-8"?>
 <p:sld xmlns:a="http://schemas.openxmlformats.org/drawingml/2006/main" xmlns:r="http://schemas.openxmlformats.org/officeDocument/2006/relationships" xmlns:p="http://schemas.openxmlformats.org/presentationml/2006/main">
   <p:cSld>
     <p:spTree>

</xml_diff>